<commit_message>
Completed base C4 drawing - not code drawing
</commit_message>
<xml_diff>
--- a/Documentation/UML C4 Drawings.pptx
+++ b/Documentation/UML C4 Drawings.pptx
@@ -8,7 +8,7 @@
     <p:sldId id="256" r:id="rId2"/>
     <p:sldId id="257" r:id="rId3"/>
     <p:sldId id="261" r:id="rId4"/>
-    <p:sldId id="263" r:id="rId5"/>
+    <p:sldId id="264" r:id="rId5"/>
   </p:sldIdLst>
   <p:sldSz cx="12192000" cy="6858000"/>
   <p:notesSz cx="6858000" cy="9144000"/>
@@ -264,7 +264,7 @@
           <a:p>
             <a:fld id="{B900FCB7-7F2B-4320-A2FE-153FD842BAF6}" type="datetimeFigureOut">
               <a:rPr lang="en-GB" smtClean="0"/>
-              <a:t>16/02/2021</a:t>
+              <a:t>22/02/2021</a:t>
             </a:fld>
             <a:endParaRPr lang="en-GB"/>
           </a:p>
@@ -464,7 +464,7 @@
           <a:p>
             <a:fld id="{B900FCB7-7F2B-4320-A2FE-153FD842BAF6}" type="datetimeFigureOut">
               <a:rPr lang="en-GB" smtClean="0"/>
-              <a:t>16/02/2021</a:t>
+              <a:t>22/02/2021</a:t>
             </a:fld>
             <a:endParaRPr lang="en-GB"/>
           </a:p>
@@ -674,7 +674,7 @@
           <a:p>
             <a:fld id="{B900FCB7-7F2B-4320-A2FE-153FD842BAF6}" type="datetimeFigureOut">
               <a:rPr lang="en-GB" smtClean="0"/>
-              <a:t>16/02/2021</a:t>
+              <a:t>22/02/2021</a:t>
             </a:fld>
             <a:endParaRPr lang="en-GB"/>
           </a:p>
@@ -874,7 +874,7 @@
           <a:p>
             <a:fld id="{B900FCB7-7F2B-4320-A2FE-153FD842BAF6}" type="datetimeFigureOut">
               <a:rPr lang="en-GB" smtClean="0"/>
-              <a:t>16/02/2021</a:t>
+              <a:t>22/02/2021</a:t>
             </a:fld>
             <a:endParaRPr lang="en-GB"/>
           </a:p>
@@ -1150,7 +1150,7 @@
           <a:p>
             <a:fld id="{B900FCB7-7F2B-4320-A2FE-153FD842BAF6}" type="datetimeFigureOut">
               <a:rPr lang="en-GB" smtClean="0"/>
-              <a:t>16/02/2021</a:t>
+              <a:t>22/02/2021</a:t>
             </a:fld>
             <a:endParaRPr lang="en-GB"/>
           </a:p>
@@ -1418,7 +1418,7 @@
           <a:p>
             <a:fld id="{B900FCB7-7F2B-4320-A2FE-153FD842BAF6}" type="datetimeFigureOut">
               <a:rPr lang="en-GB" smtClean="0"/>
-              <a:t>16/02/2021</a:t>
+              <a:t>22/02/2021</a:t>
             </a:fld>
             <a:endParaRPr lang="en-GB"/>
           </a:p>
@@ -1833,7 +1833,7 @@
           <a:p>
             <a:fld id="{B900FCB7-7F2B-4320-A2FE-153FD842BAF6}" type="datetimeFigureOut">
               <a:rPr lang="en-GB" smtClean="0"/>
-              <a:t>16/02/2021</a:t>
+              <a:t>22/02/2021</a:t>
             </a:fld>
             <a:endParaRPr lang="en-GB"/>
           </a:p>
@@ -1975,7 +1975,7 @@
           <a:p>
             <a:fld id="{B900FCB7-7F2B-4320-A2FE-153FD842BAF6}" type="datetimeFigureOut">
               <a:rPr lang="en-GB" smtClean="0"/>
-              <a:t>16/02/2021</a:t>
+              <a:t>22/02/2021</a:t>
             </a:fld>
             <a:endParaRPr lang="en-GB"/>
           </a:p>
@@ -2088,7 +2088,7 @@
           <a:p>
             <a:fld id="{B900FCB7-7F2B-4320-A2FE-153FD842BAF6}" type="datetimeFigureOut">
               <a:rPr lang="en-GB" smtClean="0"/>
-              <a:t>16/02/2021</a:t>
+              <a:t>22/02/2021</a:t>
             </a:fld>
             <a:endParaRPr lang="en-GB"/>
           </a:p>
@@ -2401,7 +2401,7 @@
           <a:p>
             <a:fld id="{B900FCB7-7F2B-4320-A2FE-153FD842BAF6}" type="datetimeFigureOut">
               <a:rPr lang="en-GB" smtClean="0"/>
-              <a:t>16/02/2021</a:t>
+              <a:t>22/02/2021</a:t>
             </a:fld>
             <a:endParaRPr lang="en-GB"/>
           </a:p>
@@ -2690,7 +2690,7 @@
           <a:p>
             <a:fld id="{B900FCB7-7F2B-4320-A2FE-153FD842BAF6}" type="datetimeFigureOut">
               <a:rPr lang="en-GB" smtClean="0"/>
-              <a:t>16/02/2021</a:t>
+              <a:t>22/02/2021</a:t>
             </a:fld>
             <a:endParaRPr lang="en-GB"/>
           </a:p>
@@ -2933,7 +2933,7 @@
           <a:p>
             <a:fld id="{B900FCB7-7F2B-4320-A2FE-153FD842BAF6}" type="datetimeFigureOut">
               <a:rPr lang="en-GB" smtClean="0"/>
-              <a:t>16/02/2021</a:t>
+              <a:t>22/02/2021</a:t>
             </a:fld>
             <a:endParaRPr lang="en-GB"/>
           </a:p>
@@ -3685,6 +3685,11 @@
           <a:prstGeom prst="roundRect">
             <a:avLst/>
           </a:prstGeom>
+          <a:solidFill>
+            <a:schemeClr val="accent5">
+              <a:lumMod val="75000"/>
+            </a:schemeClr>
+          </a:solidFill>
         </p:spPr>
         <p:style>
           <a:lnRef idx="2">
@@ -3898,6 +3903,11 @@
           <a:prstGeom prst="roundRect">
             <a:avLst/>
           </a:prstGeom>
+          <a:solidFill>
+            <a:schemeClr val="accent5">
+              <a:lumMod val="75000"/>
+            </a:schemeClr>
+          </a:solidFill>
         </p:spPr>
         <p:style>
           <a:lnRef idx="2">
@@ -4333,6 +4343,11 @@
           <a:prstGeom prst="roundRect">
             <a:avLst/>
           </a:prstGeom>
+          <a:solidFill>
+            <a:schemeClr val="accent5">
+              <a:lumMod val="75000"/>
+            </a:schemeClr>
+          </a:solidFill>
         </p:spPr>
         <p:style>
           <a:lnRef idx="2">
@@ -4459,6 +4474,11 @@
           <a:prstGeom prst="roundRect">
             <a:avLst/>
           </a:prstGeom>
+          <a:solidFill>
+            <a:schemeClr val="accent5">
+              <a:lumMod val="75000"/>
+            </a:schemeClr>
+          </a:solidFill>
         </p:spPr>
         <p:style>
           <a:lnRef idx="2">
@@ -4776,7 +4796,7 @@
             <a:pPr algn="ctr"/>
             <a:r>
               <a:rPr lang="en-GB" sz="1050" b="1" dirty="0"/>
-              <a:t>Python Code</a:t>
+              <a:t>To-Do App</a:t>
             </a:r>
           </a:p>
         </p:txBody>
@@ -4948,8 +4968,8 @@
         </p:nvSpPr>
         <p:spPr>
           <a:xfrm>
-            <a:off x="8536737" y="3061731"/>
-            <a:ext cx="1528222" cy="1123384"/>
+            <a:off x="8536737" y="3079428"/>
+            <a:ext cx="1528222" cy="1107996"/>
           </a:xfrm>
           <a:prstGeom prst="rect">
             <a:avLst/>
@@ -4964,12 +4984,12 @@
           <a:p>
             <a:pPr algn="ctr"/>
             <a:r>
-              <a:rPr lang="en-GB" sz="1200" b="1" i="1" dirty="0">
+              <a:rPr lang="en-GB" sz="1100" b="1" i="1" dirty="0">
                 <a:solidFill>
                   <a:schemeClr val="bg1"/>
                 </a:solidFill>
               </a:rPr>
-              <a:t>Application Control</a:t>
+              <a:t>Python Code</a:t>
             </a:r>
           </a:p>
           <a:p>
@@ -6171,6 +6191,55 @@
                 </a:solidFill>
               </a:rPr>
               <a:t>Data read and writes from store</a:t>
+            </a:r>
+          </a:p>
+        </p:txBody>
+      </p:sp>
+      <p:sp>
+        <p:nvSpPr>
+          <p:cNvPr id="44" name="Rectangle: Rounded Corners 43">
+            <a:extLst>
+              <a:ext uri="{FF2B5EF4-FFF2-40B4-BE49-F238E27FC236}">
+                <a16:creationId xmlns:a16="http://schemas.microsoft.com/office/drawing/2014/main" id="{1C453D7F-BAFA-4D02-B5DC-DA1E42C48006}"/>
+              </a:ext>
+            </a:extLst>
+          </p:cNvPr>
+          <p:cNvSpPr/>
+          <p:nvPr/>
+        </p:nvSpPr>
+        <p:spPr>
+          <a:xfrm>
+            <a:off x="1010155" y="2331377"/>
+            <a:ext cx="1138334" cy="270588"/>
+          </a:xfrm>
+          <a:prstGeom prst="roundRect">
+            <a:avLst/>
+          </a:prstGeom>
+        </p:spPr>
+        <p:style>
+          <a:lnRef idx="2">
+            <a:schemeClr val="accent4">
+              <a:shade val="50000"/>
+            </a:schemeClr>
+          </a:lnRef>
+          <a:fillRef idx="1">
+            <a:schemeClr val="accent4"/>
+          </a:fillRef>
+          <a:effectRef idx="0">
+            <a:schemeClr val="accent4"/>
+          </a:effectRef>
+          <a:fontRef idx="minor">
+            <a:schemeClr val="lt1"/>
+          </a:fontRef>
+        </p:style>
+        <p:txBody>
+          <a:bodyPr rtlCol="0" anchor="ctr"/>
+          <a:lstStyle/>
+          <a:p>
+            <a:pPr algn="ctr"/>
+            <a:r>
+              <a:rPr lang="en-GB" sz="1050" b="1" dirty="0"/>
+              <a:t>Browser</a:t>
             </a:r>
           </a:p>
         </p:txBody>
@@ -6207,79 +6276,10 @@
       </p:grpSpPr>
       <p:sp>
         <p:nvSpPr>
-          <p:cNvPr id="2" name="Title 1">
-            <a:extLst>
-              <a:ext uri="{FF2B5EF4-FFF2-40B4-BE49-F238E27FC236}">
-                <a16:creationId xmlns:a16="http://schemas.microsoft.com/office/drawing/2014/main" id="{804196C0-695E-4F1F-9F14-B8E2A35C963C}"/>
-              </a:ext>
-            </a:extLst>
-          </p:cNvPr>
-          <p:cNvSpPr>
-            <a:spLocks noGrp="1"/>
-          </p:cNvSpPr>
-          <p:nvPr>
-            <p:ph type="title"/>
-          </p:nvPr>
-        </p:nvSpPr>
-        <p:spPr/>
-        <p:txBody>
-          <a:bodyPr anchor="t">
-            <a:normAutofit/>
-          </a:bodyPr>
-          <a:lstStyle/>
-          <a:p>
-            <a:r>
-              <a:rPr lang="en-GB" sz="2400" dirty="0"/>
-              <a:t>System Component diagram for Andy’s To-Do App</a:t>
-            </a:r>
-          </a:p>
-        </p:txBody>
-      </p:sp>
-      <p:pic>
-        <p:nvPicPr>
-          <p:cNvPr id="14" name="Graphic 13" descr="Internet">
-            <a:extLst>
-              <a:ext uri="{FF2B5EF4-FFF2-40B4-BE49-F238E27FC236}">
-                <a16:creationId xmlns:a16="http://schemas.microsoft.com/office/drawing/2014/main" id="{21A7DE95-923B-4413-855D-3EC3B356424A}"/>
-              </a:ext>
-            </a:extLst>
-          </p:cNvPr>
-          <p:cNvPicPr>
-            <a:picLocks noChangeAspect="1"/>
-          </p:cNvPicPr>
-          <p:nvPr/>
-        </p:nvPicPr>
-        <p:blipFill>
-          <a:blip r:embed="rId2">
-            <a:extLst>
-              <a:ext uri="{28A0092B-C50C-407E-A947-70E740481C1C}">
-                <a14:useLocalDpi xmlns:a14="http://schemas.microsoft.com/office/drawing/2010/main" val="0"/>
-              </a:ext>
-              <a:ext uri="{96DAC541-7B7A-43D3-8B79-37D633B846F1}">
-                <asvg:svgBlip xmlns:asvg="http://schemas.microsoft.com/office/drawing/2016/SVG/main" r:embed="rId3"/>
-              </a:ext>
-            </a:extLst>
-          </a:blip>
-          <a:stretch>
-            <a:fillRect/>
-          </a:stretch>
-        </p:blipFill>
-        <p:spPr>
-          <a:xfrm>
-            <a:off x="716948" y="1703657"/>
-            <a:ext cx="1732156" cy="1732156"/>
-          </a:xfrm>
-          <a:prstGeom prst="rect">
-            <a:avLst/>
-          </a:prstGeom>
-        </p:spPr>
-      </p:pic>
-      <p:sp>
-        <p:nvSpPr>
-          <p:cNvPr id="15" name="Rectangle: Rounded Corners 14">
-            <a:extLst>
-              <a:ext uri="{FF2B5EF4-FFF2-40B4-BE49-F238E27FC236}">
-                <a16:creationId xmlns:a16="http://schemas.microsoft.com/office/drawing/2014/main" id="{ED210875-8A99-46B1-B897-33BB0E924941}"/>
+          <p:cNvPr id="7" name="Rectangle: Rounded Corners 6">
+            <a:extLst>
+              <a:ext uri="{FF2B5EF4-FFF2-40B4-BE49-F238E27FC236}">
+                <a16:creationId xmlns:a16="http://schemas.microsoft.com/office/drawing/2014/main" id="{6602B7B1-86F0-4535-BEFB-22C480484496}"/>
               </a:ext>
             </a:extLst>
           </p:cNvPr>
@@ -6288,21 +6288,17 @@
         </p:nvSpPr>
         <p:spPr>
           <a:xfrm>
-            <a:off x="546047" y="1518991"/>
-            <a:ext cx="3419463" cy="2140796"/>
+            <a:off x="194680" y="1626123"/>
+            <a:ext cx="10737700" cy="2669774"/>
           </a:xfrm>
           <a:prstGeom prst="roundRect">
             <a:avLst/>
           </a:prstGeom>
-          <a:noFill/>
-          <a:ln>
-            <a:solidFill>
-              <a:schemeClr val="accent2">
-                <a:lumMod val="75000"/>
-              </a:schemeClr>
-            </a:solidFill>
-            <a:prstDash val="sysDot"/>
-          </a:ln>
+          <a:solidFill>
+            <a:schemeClr val="accent5">
+              <a:lumMod val="75000"/>
+            </a:schemeClr>
+          </a:solidFill>
         </p:spPr>
         <p:style>
           <a:lnRef idx="2">
@@ -6321,26 +6317,22 @@
           </a:fontRef>
         </p:style>
         <p:txBody>
-          <a:bodyPr rtlCol="0" anchor="t"/>
-          <a:lstStyle/>
-          <a:p>
-            <a:r>
-              <a:rPr lang="en-GB" dirty="0">
-                <a:solidFill>
-                  <a:srgbClr val="002060"/>
-                </a:solidFill>
-              </a:rPr>
-              <a:t>Local Machine</a:t>
-            </a:r>
-          </a:p>
-        </p:txBody>
-      </p:sp>
-      <p:sp>
-        <p:nvSpPr>
-          <p:cNvPr id="16" name="Rectangle: Rounded Corners 15">
-            <a:extLst>
-              <a:ext uri="{FF2B5EF4-FFF2-40B4-BE49-F238E27FC236}">
-                <a16:creationId xmlns:a16="http://schemas.microsoft.com/office/drawing/2014/main" id="{CE20AFF6-45AA-4189-900F-A216CD037942}"/>
+          <a:bodyPr rtlCol="0" anchor="ctr"/>
+          <a:lstStyle/>
+          <a:p>
+            <a:r>
+              <a:rPr lang="en-GB" b="1" dirty="0"/>
+              <a:t>To-Do App</a:t>
+            </a:r>
+          </a:p>
+        </p:txBody>
+      </p:sp>
+      <p:sp>
+        <p:nvSpPr>
+          <p:cNvPr id="78" name="Rectangle: Rounded Corners 77">
+            <a:extLst>
+              <a:ext uri="{FF2B5EF4-FFF2-40B4-BE49-F238E27FC236}">
+                <a16:creationId xmlns:a16="http://schemas.microsoft.com/office/drawing/2014/main" id="{157AD506-8262-4D71-8CD2-72F10D1EA096}"/>
               </a:ext>
             </a:extLst>
           </p:cNvPr>
@@ -6349,16 +6341,12 @@
         </p:nvSpPr>
         <p:spPr>
           <a:xfrm>
-            <a:off x="533286" y="4432284"/>
-            <a:ext cx="3419463" cy="2140796"/>
+            <a:off x="7381964" y="1738415"/>
+            <a:ext cx="1736435" cy="2504769"/>
           </a:xfrm>
           <a:prstGeom prst="roundRect">
             <a:avLst/>
           </a:prstGeom>
-          <a:noFill/>
-          <a:ln>
-            <a:prstDash val="sysDot"/>
-          </a:ln>
         </p:spPr>
         <p:style>
           <a:lnRef idx="2">
@@ -6377,26 +6365,58 @@
           </a:fontRef>
         </p:style>
         <p:txBody>
-          <a:bodyPr rtlCol="0" anchor="t"/>
-          <a:lstStyle/>
-          <a:p>
+          <a:bodyPr rtlCol="0" anchor="b"/>
+          <a:lstStyle/>
+          <a:p>
+            <a:pPr algn="ctr"/>
             <a:r>
               <a:rPr lang="en-GB" dirty="0">
-                <a:solidFill>
-                  <a:srgbClr val="002060"/>
-                </a:solidFill>
+                <a:ln>
+                  <a:noFill/>
+                  <a:prstDash val="dash"/>
+                </a:ln>
               </a:rPr>
-              <a:t>Remote Service</a:t>
-            </a:r>
-          </a:p>
-        </p:txBody>
-      </p:sp>
-      <p:sp>
-        <p:nvSpPr>
-          <p:cNvPr id="7" name="Rectangle: Rounded Corners 6">
-            <a:extLst>
-              <a:ext uri="{FF2B5EF4-FFF2-40B4-BE49-F238E27FC236}">
-                <a16:creationId xmlns:a16="http://schemas.microsoft.com/office/drawing/2014/main" id="{6602B7B1-86F0-4535-BEFB-22C480484496}"/>
+              <a:t>PYTHON CODE</a:t>
+            </a:r>
+          </a:p>
+        </p:txBody>
+      </p:sp>
+      <p:sp>
+        <p:nvSpPr>
+          <p:cNvPr id="2" name="Title 1">
+            <a:extLst>
+              <a:ext uri="{FF2B5EF4-FFF2-40B4-BE49-F238E27FC236}">
+                <a16:creationId xmlns:a16="http://schemas.microsoft.com/office/drawing/2014/main" id="{804196C0-695E-4F1F-9F14-B8E2A35C963C}"/>
+              </a:ext>
+            </a:extLst>
+          </p:cNvPr>
+          <p:cNvSpPr>
+            <a:spLocks noGrp="1"/>
+          </p:cNvSpPr>
+          <p:nvPr>
+            <p:ph type="title"/>
+          </p:nvPr>
+        </p:nvSpPr>
+        <p:spPr/>
+        <p:txBody>
+          <a:bodyPr anchor="t">
+            <a:normAutofit/>
+          </a:bodyPr>
+          <a:lstStyle/>
+          <a:p>
+            <a:r>
+              <a:rPr lang="en-GB" sz="2400" dirty="0"/>
+              <a:t>System Component diagram for Andy’s To-Do App</a:t>
+            </a:r>
+          </a:p>
+        </p:txBody>
+      </p:sp>
+      <p:sp>
+        <p:nvSpPr>
+          <p:cNvPr id="16" name="Rectangle: Rounded Corners 15">
+            <a:extLst>
+              <a:ext uri="{FF2B5EF4-FFF2-40B4-BE49-F238E27FC236}">
+                <a16:creationId xmlns:a16="http://schemas.microsoft.com/office/drawing/2014/main" id="{CE20AFF6-45AA-4189-900F-A216CD037942}"/>
               </a:ext>
             </a:extLst>
           </p:cNvPr>
@@ -6405,12 +6425,16 @@
         </p:nvSpPr>
         <p:spPr>
           <a:xfrm>
-            <a:off x="2094381" y="2564433"/>
-            <a:ext cx="9895455" cy="914400"/>
+            <a:off x="533286" y="4432284"/>
+            <a:ext cx="3419463" cy="2140796"/>
           </a:xfrm>
           <a:prstGeom prst="roundRect">
             <a:avLst/>
           </a:prstGeom>
+          <a:noFill/>
+          <a:ln>
+            <a:prstDash val="sysDot"/>
+          </a:ln>
         </p:spPr>
         <p:style>
           <a:lnRef idx="2">
@@ -6429,22 +6453,26 @@
           </a:fontRef>
         </p:style>
         <p:txBody>
-          <a:bodyPr rtlCol="0" anchor="ctr"/>
-          <a:lstStyle/>
-          <a:p>
-            <a:r>
-              <a:rPr lang="en-GB" b="1" dirty="0"/>
-              <a:t>To-Do App</a:t>
+          <a:bodyPr rtlCol="0" anchor="t"/>
+          <a:lstStyle/>
+          <a:p>
+            <a:r>
+              <a:rPr lang="en-GB" dirty="0">
+                <a:solidFill>
+                  <a:srgbClr val="002060"/>
+                </a:solidFill>
+              </a:rPr>
+              <a:t>Remote Service</a:t>
             </a:r>
           </a:p>
         </p:txBody>
       </p:sp>
       <p:pic>
         <p:nvPicPr>
-          <p:cNvPr id="6" name="Graphic 5" descr="User">
-            <a:extLst>
-              <a:ext uri="{FF2B5EF4-FFF2-40B4-BE49-F238E27FC236}">
-                <a16:creationId xmlns:a16="http://schemas.microsoft.com/office/drawing/2014/main" id="{6A79A9BF-DC65-4D5F-9965-C01AD01298DA}"/>
+          <p:cNvPr id="18" name="Graphic 17" descr="World">
+            <a:extLst>
+              <a:ext uri="{FF2B5EF4-FFF2-40B4-BE49-F238E27FC236}">
+                <a16:creationId xmlns:a16="http://schemas.microsoft.com/office/drawing/2014/main" id="{BB093330-2440-4C2E-B81C-F9A1A0EA5B3F}"/>
               </a:ext>
             </a:extLst>
           </p:cNvPr>
@@ -6454,13 +6482,13 @@
           <p:nvPr/>
         </p:nvPicPr>
         <p:blipFill>
-          <a:blip r:embed="rId4">
+          <a:blip r:embed="rId2">
             <a:extLst>
               <a:ext uri="{28A0092B-C50C-407E-A947-70E740481C1C}">
                 <a14:useLocalDpi xmlns:a14="http://schemas.microsoft.com/office/drawing/2010/main" val="0"/>
               </a:ext>
               <a:ext uri="{96DAC541-7B7A-43D3-8B79-37D633B846F1}">
-                <asvg:svgBlip xmlns:asvg="http://schemas.microsoft.com/office/drawing/2016/SVG/main" r:embed="rId5"/>
+                <asvg:svgBlip xmlns:asvg="http://schemas.microsoft.com/office/drawing/2016/SVG/main" r:embed="rId3"/>
               </a:ext>
             </a:extLst>
           </a:blip>
@@ -6470,45 +6498,6 @@
         </p:blipFill>
         <p:spPr>
           <a:xfrm>
-            <a:off x="2021793" y="633379"/>
-            <a:ext cx="2114618" cy="2114618"/>
-          </a:xfrm>
-          <a:prstGeom prst="rect">
-            <a:avLst/>
-          </a:prstGeom>
-        </p:spPr>
-      </p:pic>
-      <p:pic>
-        <p:nvPicPr>
-          <p:cNvPr id="18" name="Graphic 17" descr="World">
-            <a:extLst>
-              <a:ext uri="{FF2B5EF4-FFF2-40B4-BE49-F238E27FC236}">
-                <a16:creationId xmlns:a16="http://schemas.microsoft.com/office/drawing/2014/main" id="{BB093330-2440-4C2E-B81C-F9A1A0EA5B3F}"/>
-              </a:ext>
-            </a:extLst>
-          </p:cNvPr>
-          <p:cNvPicPr>
-            <a:picLocks noChangeAspect="1"/>
-          </p:cNvPicPr>
-          <p:nvPr/>
-        </p:nvPicPr>
-        <p:blipFill>
-          <a:blip r:embed="rId6">
-            <a:extLst>
-              <a:ext uri="{28A0092B-C50C-407E-A947-70E740481C1C}">
-                <a14:useLocalDpi xmlns:a14="http://schemas.microsoft.com/office/drawing/2010/main" val="0"/>
-              </a:ext>
-              <a:ext uri="{96DAC541-7B7A-43D3-8B79-37D633B846F1}">
-                <asvg:svgBlip xmlns:asvg="http://schemas.microsoft.com/office/drawing/2016/SVG/main" r:embed="rId7"/>
-              </a:ext>
-            </a:extLst>
-          </a:blip>
-          <a:stretch>
-            <a:fillRect/>
-          </a:stretch>
-        </p:blipFill>
-        <p:spPr>
-          <a:xfrm>
             <a:off x="786791" y="4884420"/>
             <a:ext cx="1592470" cy="1592470"/>
           </a:xfrm>
@@ -6537,6 +6526,11 @@
           <a:prstGeom prst="roundRect">
             <a:avLst/>
           </a:prstGeom>
+          <a:solidFill>
+            <a:schemeClr val="accent5">
+              <a:lumMod val="75000"/>
+            </a:schemeClr>
+          </a:solidFill>
         </p:spPr>
         <p:style>
           <a:lnRef idx="2">
@@ -6579,7 +6573,7 @@
         </p:nvSpPr>
         <p:spPr>
           <a:xfrm>
-            <a:off x="5626705" y="2596394"/>
+            <a:off x="4569248" y="1658084"/>
             <a:ext cx="1138334" cy="270588"/>
           </a:xfrm>
           <a:prstGeom prst="roundRect">
@@ -6628,7 +6622,7 @@
         </p:nvSpPr>
         <p:spPr>
           <a:xfrm>
-            <a:off x="10277129" y="2596394"/>
+            <a:off x="9219672" y="1658084"/>
             <a:ext cx="1138334" cy="270588"/>
           </a:xfrm>
           <a:prstGeom prst="roundRect">
@@ -6775,7 +6769,7 @@
         </p:nvSpPr>
         <p:spPr>
           <a:xfrm>
-            <a:off x="7177750" y="2601038"/>
+            <a:off x="6120293" y="1662728"/>
             <a:ext cx="1138334" cy="270588"/>
           </a:xfrm>
           <a:prstGeom prst="roundRect">
@@ -6824,7 +6818,7 @@
         </p:nvSpPr>
         <p:spPr>
           <a:xfrm>
-            <a:off x="8728795" y="2596394"/>
+            <a:off x="7671338" y="1658084"/>
             <a:ext cx="1138334" cy="270588"/>
           </a:xfrm>
           <a:prstGeom prst="roundRect">
@@ -6854,270 +6848,7 @@
             <a:pPr algn="ctr"/>
             <a:r>
               <a:rPr lang="en-GB" sz="1050" b="1" dirty="0"/>
-              <a:t>Python Code</a:t>
-            </a:r>
-          </a:p>
-        </p:txBody>
-      </p:sp>
-      <p:sp>
-        <p:nvSpPr>
-          <p:cNvPr id="20" name="TextBox 19">
-            <a:extLst>
-              <a:ext uri="{FF2B5EF4-FFF2-40B4-BE49-F238E27FC236}">
-                <a16:creationId xmlns:a16="http://schemas.microsoft.com/office/drawing/2014/main" id="{51483F07-96D2-4798-8154-C2029B60EAA4}"/>
-              </a:ext>
-            </a:extLst>
-          </p:cNvPr>
-          <p:cNvSpPr txBox="1"/>
-          <p:nvPr/>
-        </p:nvSpPr>
-        <p:spPr>
-          <a:xfrm>
-            <a:off x="3883427" y="3061731"/>
-            <a:ext cx="1528222" cy="1138773"/>
-          </a:xfrm>
-          <a:prstGeom prst="rect">
-            <a:avLst/>
-          </a:prstGeom>
-          <a:noFill/>
-        </p:spPr>
-        <p:txBody>
-          <a:bodyPr wrap="square" rtlCol="0">
-            <a:spAutoFit/>
-          </a:bodyPr>
-          <a:lstStyle/>
-          <a:p>
-            <a:pPr algn="ctr"/>
-            <a:r>
-              <a:rPr lang="en-GB" sz="1200" b="1" i="1" dirty="0">
-                <a:solidFill>
-                  <a:schemeClr val="bg1"/>
-                </a:solidFill>
-              </a:rPr>
-              <a:t>Web Server Gateway Interface</a:t>
-            </a:r>
-          </a:p>
-          <a:p>
-            <a:pPr algn="ctr"/>
-            <a:r>
-              <a:rPr lang="en-GB" sz="1100" i="1" dirty="0">
-                <a:solidFill>
-                  <a:srgbClr val="002060"/>
-                </a:solidFill>
-              </a:rPr>
-              <a:t>Handles requests and responses and passes these to the web application server</a:t>
-            </a:r>
-          </a:p>
-        </p:txBody>
-      </p:sp>
-      <p:sp>
-        <p:nvSpPr>
-          <p:cNvPr id="22" name="TextBox 21">
-            <a:extLst>
-              <a:ext uri="{FF2B5EF4-FFF2-40B4-BE49-F238E27FC236}">
-                <a16:creationId xmlns:a16="http://schemas.microsoft.com/office/drawing/2014/main" id="{A66ADEA8-CA12-4DAD-9F79-D82F7E35598B}"/>
-              </a:ext>
-            </a:extLst>
-          </p:cNvPr>
-          <p:cNvSpPr txBox="1"/>
-          <p:nvPr/>
-        </p:nvSpPr>
-        <p:spPr>
-          <a:xfrm>
-            <a:off x="5435434" y="3056986"/>
-            <a:ext cx="1528222" cy="969496"/>
-          </a:xfrm>
-          <a:prstGeom prst="rect">
-            <a:avLst/>
-          </a:prstGeom>
-          <a:noFill/>
-        </p:spPr>
-        <p:txBody>
-          <a:bodyPr wrap="square" rtlCol="0">
-            <a:spAutoFit/>
-          </a:bodyPr>
-          <a:lstStyle/>
-          <a:p>
-            <a:pPr algn="ctr"/>
-            <a:r>
-              <a:rPr lang="en-GB" sz="1200" b="1" i="1" dirty="0">
-                <a:solidFill>
-                  <a:schemeClr val="bg1"/>
-                </a:solidFill>
-              </a:rPr>
-              <a:t>Web Application Framework</a:t>
-            </a:r>
-          </a:p>
-          <a:p>
-            <a:pPr algn="ctr"/>
-            <a:r>
-              <a:rPr lang="en-GB" sz="1100" i="1" dirty="0">
-                <a:solidFill>
-                  <a:srgbClr val="002060"/>
-                </a:solidFill>
-              </a:rPr>
-              <a:t>Controls common web operations for the To-Do Application Code</a:t>
-            </a:r>
-          </a:p>
-        </p:txBody>
-      </p:sp>
-      <p:sp>
-        <p:nvSpPr>
-          <p:cNvPr id="23" name="TextBox 22">
-            <a:extLst>
-              <a:ext uri="{FF2B5EF4-FFF2-40B4-BE49-F238E27FC236}">
-                <a16:creationId xmlns:a16="http://schemas.microsoft.com/office/drawing/2014/main" id="{05F171E0-2492-446B-94B3-6F26B883AA40}"/>
-              </a:ext>
-            </a:extLst>
-          </p:cNvPr>
-          <p:cNvSpPr txBox="1"/>
-          <p:nvPr/>
-        </p:nvSpPr>
-        <p:spPr>
-          <a:xfrm>
-            <a:off x="6988403" y="3061731"/>
-            <a:ext cx="1528222" cy="1308050"/>
-          </a:xfrm>
-          <a:prstGeom prst="rect">
-            <a:avLst/>
-          </a:prstGeom>
-          <a:noFill/>
-        </p:spPr>
-        <p:txBody>
-          <a:bodyPr wrap="square" rtlCol="0">
-            <a:spAutoFit/>
-          </a:bodyPr>
-          <a:lstStyle/>
-          <a:p>
-            <a:pPr algn="ctr"/>
-            <a:r>
-              <a:rPr lang="en-GB" sz="1200" b="1" i="1" dirty="0">
-                <a:solidFill>
-                  <a:schemeClr val="bg1"/>
-                </a:solidFill>
-              </a:rPr>
-              <a:t>Presentation Structure</a:t>
-            </a:r>
-          </a:p>
-          <a:p>
-            <a:pPr algn="ctr"/>
-            <a:r>
-              <a:rPr lang="en-GB" sz="1100" i="1" dirty="0">
-                <a:solidFill>
-                  <a:srgbClr val="002060"/>
-                </a:solidFill>
-              </a:rPr>
-              <a:t>Details how information is organised for the user to view it within their browser</a:t>
-            </a:r>
-          </a:p>
-        </p:txBody>
-      </p:sp>
-      <p:sp>
-        <p:nvSpPr>
-          <p:cNvPr id="24" name="TextBox 23">
-            <a:extLst>
-              <a:ext uri="{FF2B5EF4-FFF2-40B4-BE49-F238E27FC236}">
-                <a16:creationId xmlns:a16="http://schemas.microsoft.com/office/drawing/2014/main" id="{1D919025-FEBC-486B-99D3-6088F8802C7F}"/>
-              </a:ext>
-            </a:extLst>
-          </p:cNvPr>
-          <p:cNvSpPr txBox="1"/>
-          <p:nvPr/>
-        </p:nvSpPr>
-        <p:spPr>
-          <a:xfrm>
-            <a:off x="8536737" y="3061731"/>
-            <a:ext cx="1528222" cy="1123384"/>
-          </a:xfrm>
-          <a:prstGeom prst="rect">
-            <a:avLst/>
-          </a:prstGeom>
-          <a:noFill/>
-        </p:spPr>
-        <p:txBody>
-          <a:bodyPr wrap="square" rtlCol="0">
-            <a:spAutoFit/>
-          </a:bodyPr>
-          <a:lstStyle/>
-          <a:p>
-            <a:pPr algn="ctr"/>
-            <a:r>
-              <a:rPr lang="en-GB" sz="1200" b="1" i="1" dirty="0">
-                <a:solidFill>
-                  <a:schemeClr val="bg1"/>
-                </a:solidFill>
-              </a:rPr>
-              <a:t>Application Control</a:t>
-            </a:r>
-          </a:p>
-          <a:p>
-            <a:pPr algn="ctr"/>
-            <a:endParaRPr lang="en-GB" sz="1100" i="1" dirty="0">
-              <a:solidFill>
-                <a:srgbClr val="002060"/>
-              </a:solidFill>
-            </a:endParaRPr>
-          </a:p>
-          <a:p>
-            <a:pPr algn="ctr"/>
-            <a:r>
-              <a:rPr lang="en-GB" sz="1100" i="1" dirty="0">
-                <a:solidFill>
-                  <a:srgbClr val="002060"/>
-                </a:solidFill>
-              </a:rPr>
-              <a:t>Contains instructions on the core functions needed to run the application</a:t>
-            </a:r>
-          </a:p>
-        </p:txBody>
-      </p:sp>
-      <p:sp>
-        <p:nvSpPr>
-          <p:cNvPr id="26" name="TextBox 25">
-            <a:extLst>
-              <a:ext uri="{FF2B5EF4-FFF2-40B4-BE49-F238E27FC236}">
-                <a16:creationId xmlns:a16="http://schemas.microsoft.com/office/drawing/2014/main" id="{41E59BDE-269E-47D5-812C-64C4147C03A2}"/>
-              </a:ext>
-            </a:extLst>
-          </p:cNvPr>
-          <p:cNvSpPr txBox="1"/>
-          <p:nvPr/>
-        </p:nvSpPr>
-        <p:spPr>
-          <a:xfrm>
-            <a:off x="10082185" y="2884447"/>
-            <a:ext cx="1528222" cy="1323439"/>
-          </a:xfrm>
-          <a:prstGeom prst="rect">
-            <a:avLst/>
-          </a:prstGeom>
-          <a:noFill/>
-        </p:spPr>
-        <p:txBody>
-          <a:bodyPr wrap="square" rtlCol="0">
-            <a:spAutoFit/>
-          </a:bodyPr>
-          <a:lstStyle/>
-          <a:p>
-            <a:pPr algn="ctr"/>
-            <a:r>
-              <a:rPr lang="en-GB" sz="1200" b="1" i="1" dirty="0">
-                <a:solidFill>
-                  <a:schemeClr val="bg1"/>
-                </a:solidFill>
-              </a:rPr>
-              <a:t>Application Programmable Interface</a:t>
-            </a:r>
-          </a:p>
-          <a:p>
-            <a:pPr algn="ctr"/>
-            <a:r>
-              <a:rPr lang="en-GB" sz="1100" i="1" dirty="0">
-                <a:solidFill>
-                  <a:srgbClr val="002060"/>
-                </a:solidFill>
-              </a:rPr>
-              <a:t>The method used to transfer data between the application and the data store</a:t>
+              <a:t>To-Do App</a:t>
             </a:r>
           </a:p>
         </p:txBody>
@@ -7136,7 +6867,7 @@
         </p:nvSpPr>
         <p:spPr>
           <a:xfrm>
-            <a:off x="4078371" y="2596394"/>
+            <a:off x="3020914" y="1658084"/>
             <a:ext cx="1138334" cy="270588"/>
           </a:xfrm>
           <a:prstGeom prst="roundRect">
@@ -7186,7 +6917,7 @@
         </p:nvSpPr>
         <p:spPr>
           <a:xfrm>
-            <a:off x="9693517" y="2147331"/>
+            <a:off x="8636060" y="1209021"/>
             <a:ext cx="914400" cy="914400"/>
           </a:xfrm>
           <a:prstGeom prst="arc">
@@ -7242,7 +6973,7 @@
         </p:nvSpPr>
         <p:spPr>
           <a:xfrm>
-            <a:off x="5012476" y="2156767"/>
+            <a:off x="3955019" y="1218457"/>
             <a:ext cx="914400" cy="914400"/>
           </a:xfrm>
           <a:prstGeom prst="arc">
@@ -7298,7 +7029,7 @@
         </p:nvSpPr>
         <p:spPr>
           <a:xfrm>
-            <a:off x="8075231" y="2158384"/>
+            <a:off x="7017774" y="1220074"/>
             <a:ext cx="914400" cy="914400"/>
           </a:xfrm>
           <a:prstGeom prst="arc">
@@ -7354,8 +7085,8 @@
         </p:nvSpPr>
         <p:spPr>
           <a:xfrm>
-            <a:off x="6115535" y="1436919"/>
-            <a:ext cx="3308383" cy="2308690"/>
+            <a:off x="5058078" y="956837"/>
+            <a:ext cx="3308383" cy="1349019"/>
           </a:xfrm>
           <a:prstGeom prst="arc">
             <a:avLst>
@@ -7410,7 +7141,7 @@
         </p:nvSpPr>
         <p:spPr>
           <a:xfrm>
-            <a:off x="6550090" y="2142892"/>
+            <a:off x="5492633" y="1204582"/>
             <a:ext cx="914400" cy="914400"/>
           </a:xfrm>
           <a:prstGeom prst="arc">
@@ -7466,13 +7197,13 @@
         </p:nvSpPr>
         <p:spPr>
           <a:xfrm rot="5400000">
-            <a:off x="10055328" y="3419410"/>
-            <a:ext cx="2585108" cy="1138334"/>
+            <a:off x="8183212" y="1848422"/>
+            <a:ext cx="3832650" cy="3635024"/>
           </a:xfrm>
           <a:prstGeom prst="arc">
             <a:avLst>
-              <a:gd name="adj1" fmla="val 10960741"/>
-              <a:gd name="adj2" fmla="val 21488175"/>
+              <a:gd name="adj1" fmla="val 11283586"/>
+              <a:gd name="adj2" fmla="val 19184038"/>
             </a:avLst>
           </a:prstGeom>
           <a:ln w="28575" cap="flat" cmpd="sng" algn="ctr">
@@ -7510,116 +7241,6 @@
       </p:sp>
       <p:sp>
         <p:nvSpPr>
-          <p:cNvPr id="45" name="TextBox 44">
-            <a:extLst>
-              <a:ext uri="{FF2B5EF4-FFF2-40B4-BE49-F238E27FC236}">
-                <a16:creationId xmlns:a16="http://schemas.microsoft.com/office/drawing/2014/main" id="{C4BD8D5E-3B8C-42E1-ADF8-E9419787B9FE}"/>
-              </a:ext>
-            </a:extLst>
-          </p:cNvPr>
-          <p:cNvSpPr txBox="1"/>
-          <p:nvPr/>
-        </p:nvSpPr>
-        <p:spPr>
-          <a:xfrm>
-            <a:off x="10071931" y="5408245"/>
-            <a:ext cx="1528222" cy="1323439"/>
-          </a:xfrm>
-          <a:prstGeom prst="rect">
-            <a:avLst/>
-          </a:prstGeom>
-          <a:noFill/>
-        </p:spPr>
-        <p:txBody>
-          <a:bodyPr wrap="square" rtlCol="0">
-            <a:spAutoFit/>
-          </a:bodyPr>
-          <a:lstStyle/>
-          <a:p>
-            <a:pPr algn="ctr"/>
-            <a:r>
-              <a:rPr lang="en-GB" sz="1200" b="1" i="1" dirty="0">
-                <a:solidFill>
-                  <a:schemeClr val="bg1"/>
-                </a:solidFill>
-              </a:rPr>
-              <a:t>Application Programmable Interface</a:t>
-            </a:r>
-          </a:p>
-          <a:p>
-            <a:pPr algn="ctr"/>
-            <a:r>
-              <a:rPr lang="en-GB" sz="1100" i="1" dirty="0">
-                <a:solidFill>
-                  <a:srgbClr val="002060"/>
-                </a:solidFill>
-              </a:rPr>
-              <a:t>The method used to transfer data between the application and the data store</a:t>
-            </a:r>
-          </a:p>
-        </p:txBody>
-      </p:sp>
-      <p:sp>
-        <p:nvSpPr>
-          <p:cNvPr id="46" name="TextBox 45">
-            <a:extLst>
-              <a:ext uri="{FF2B5EF4-FFF2-40B4-BE49-F238E27FC236}">
-                <a16:creationId xmlns:a16="http://schemas.microsoft.com/office/drawing/2014/main" id="{236BD033-1CBC-44CB-A1F5-F7132D26395D}"/>
-              </a:ext>
-            </a:extLst>
-          </p:cNvPr>
-          <p:cNvSpPr txBox="1"/>
-          <p:nvPr/>
-        </p:nvSpPr>
-        <p:spPr>
-          <a:xfrm>
-            <a:off x="6812346" y="5420458"/>
-            <a:ext cx="1528222" cy="815608"/>
-          </a:xfrm>
-          <a:prstGeom prst="rect">
-            <a:avLst/>
-          </a:prstGeom>
-          <a:noFill/>
-        </p:spPr>
-        <p:txBody>
-          <a:bodyPr wrap="square" rtlCol="0">
-            <a:spAutoFit/>
-          </a:bodyPr>
-          <a:lstStyle/>
-          <a:p>
-            <a:pPr algn="ctr"/>
-            <a:endParaRPr lang="en-GB" sz="1200" b="1" i="1" dirty="0">
-              <a:solidFill>
-                <a:schemeClr val="bg1"/>
-              </a:solidFill>
-            </a:endParaRPr>
-          </a:p>
-          <a:p>
-            <a:pPr algn="ctr"/>
-            <a:r>
-              <a:rPr lang="en-GB" sz="1200" b="1" i="1" dirty="0">
-                <a:solidFill>
-                  <a:schemeClr val="bg1"/>
-                </a:solidFill>
-              </a:rPr>
-              <a:t>User Information Store</a:t>
-            </a:r>
-          </a:p>
-          <a:p>
-            <a:pPr algn="ctr"/>
-            <a:r>
-              <a:rPr lang="en-GB" sz="1100" i="1" dirty="0">
-                <a:solidFill>
-                  <a:srgbClr val="002060"/>
-                </a:solidFill>
-              </a:rPr>
-              <a:t>Stores user data </a:t>
-            </a:r>
-          </a:p>
-        </p:txBody>
-      </p:sp>
-      <p:sp>
-        <p:nvSpPr>
           <p:cNvPr id="33" name="Arc 32">
             <a:extLst>
               <a:ext uri="{FF2B5EF4-FFF2-40B4-BE49-F238E27FC236}">
@@ -7632,13 +7253,13 @@
         </p:nvSpPr>
         <p:spPr>
           <a:xfrm>
-            <a:off x="1926244" y="1249561"/>
-            <a:ext cx="2729794" cy="2632437"/>
+            <a:off x="2298645" y="1128281"/>
+            <a:ext cx="1215711" cy="914400"/>
           </a:xfrm>
           <a:prstGeom prst="arc">
             <a:avLst>
-              <a:gd name="adj1" fmla="val 12058790"/>
-              <a:gd name="adj2" fmla="val 73019"/>
+              <a:gd name="adj1" fmla="val 10950389"/>
+              <a:gd name="adj2" fmla="val 205404"/>
             </a:avLst>
           </a:prstGeom>
           <a:ln w="28575" cap="flat" cmpd="sng" algn="ctr">
@@ -7671,322 +7292,6 @@
           <a:p>
             <a:pPr algn="ctr"/>
             <a:endParaRPr lang="en-GB"/>
-          </a:p>
-        </p:txBody>
-      </p:sp>
-      <p:sp>
-        <p:nvSpPr>
-          <p:cNvPr id="3" name="TextBox 2">
-            <a:extLst>
-              <a:ext uri="{FF2B5EF4-FFF2-40B4-BE49-F238E27FC236}">
-                <a16:creationId xmlns:a16="http://schemas.microsoft.com/office/drawing/2014/main" id="{F5E2604D-E25E-42DD-9745-8D7C76EA3768}"/>
-              </a:ext>
-            </a:extLst>
-          </p:cNvPr>
-          <p:cNvSpPr txBox="1"/>
-          <p:nvPr/>
-        </p:nvSpPr>
-        <p:spPr>
-          <a:xfrm>
-            <a:off x="3883427" y="967543"/>
-            <a:ext cx="1288596" cy="507831"/>
-          </a:xfrm>
-          <a:prstGeom prst="rect">
-            <a:avLst/>
-          </a:prstGeom>
-          <a:noFill/>
-        </p:spPr>
-        <p:txBody>
-          <a:bodyPr wrap="square" rtlCol="0">
-            <a:spAutoFit/>
-          </a:bodyPr>
-          <a:lstStyle/>
-          <a:p>
-            <a:r>
-              <a:rPr lang="en-GB" sz="900" dirty="0">
-                <a:solidFill>
-                  <a:srgbClr val="00B050"/>
-                </a:solidFill>
-              </a:rPr>
-              <a:t>User browser connects to </a:t>
-            </a:r>
-            <a:r>
-              <a:rPr lang="en-GB" sz="900" dirty="0" err="1">
-                <a:solidFill>
-                  <a:srgbClr val="00B050"/>
-                </a:solidFill>
-              </a:rPr>
-              <a:t>gUnicorn</a:t>
-            </a:r>
-            <a:r>
-              <a:rPr lang="en-GB" sz="900" dirty="0">
-                <a:solidFill>
-                  <a:srgbClr val="00B050"/>
-                </a:solidFill>
-              </a:rPr>
-              <a:t> presented web portal using HTTP</a:t>
-            </a:r>
-          </a:p>
-        </p:txBody>
-      </p:sp>
-      <p:sp>
-        <p:nvSpPr>
-          <p:cNvPr id="34" name="TextBox 33">
-            <a:extLst>
-              <a:ext uri="{FF2B5EF4-FFF2-40B4-BE49-F238E27FC236}">
-                <a16:creationId xmlns:a16="http://schemas.microsoft.com/office/drawing/2014/main" id="{F27E2DED-60E5-4EF4-B5D0-A3693AF52298}"/>
-              </a:ext>
-            </a:extLst>
-          </p:cNvPr>
-          <p:cNvSpPr txBox="1"/>
-          <p:nvPr/>
-        </p:nvSpPr>
-        <p:spPr>
-          <a:xfrm>
-            <a:off x="4507005" y="1704224"/>
-            <a:ext cx="1908286" cy="507831"/>
-          </a:xfrm>
-          <a:prstGeom prst="rect">
-            <a:avLst/>
-          </a:prstGeom>
-          <a:noFill/>
-        </p:spPr>
-        <p:txBody>
-          <a:bodyPr wrap="square" rtlCol="0">
-            <a:spAutoFit/>
-          </a:bodyPr>
-          <a:lstStyle/>
-          <a:p>
-            <a:pPr algn="ctr"/>
-            <a:r>
-              <a:rPr lang="en-GB" sz="900" dirty="0" err="1">
-                <a:solidFill>
-                  <a:schemeClr val="accent1"/>
-                </a:solidFill>
-              </a:rPr>
-              <a:t>gUnicorn</a:t>
-            </a:r>
-            <a:r>
-              <a:rPr lang="en-GB" sz="900" dirty="0">
-                <a:solidFill>
-                  <a:schemeClr val="accent1"/>
-                </a:solidFill>
-              </a:rPr>
-              <a:t> passes requests to Flask which in turn passes responses back to </a:t>
-            </a:r>
-            <a:r>
-              <a:rPr lang="en-GB" sz="900" dirty="0" err="1">
-                <a:solidFill>
-                  <a:schemeClr val="accent1"/>
-                </a:solidFill>
-              </a:rPr>
-              <a:t>gUnicorn</a:t>
-            </a:r>
-            <a:endParaRPr lang="en-GB" sz="900" dirty="0">
-              <a:solidFill>
-                <a:schemeClr val="accent1"/>
-              </a:solidFill>
-            </a:endParaRPr>
-          </a:p>
-        </p:txBody>
-      </p:sp>
-      <p:sp>
-        <p:nvSpPr>
-          <p:cNvPr id="35" name="TextBox 34">
-            <a:extLst>
-              <a:ext uri="{FF2B5EF4-FFF2-40B4-BE49-F238E27FC236}">
-                <a16:creationId xmlns:a16="http://schemas.microsoft.com/office/drawing/2014/main" id="{51ADA476-5E8C-4633-A7FC-81B6A7491C54}"/>
-              </a:ext>
-            </a:extLst>
-          </p:cNvPr>
-          <p:cNvSpPr txBox="1"/>
-          <p:nvPr/>
-        </p:nvSpPr>
-        <p:spPr>
-          <a:xfrm>
-            <a:off x="6799050" y="1051889"/>
-            <a:ext cx="1908286" cy="369332"/>
-          </a:xfrm>
-          <a:prstGeom prst="rect">
-            <a:avLst/>
-          </a:prstGeom>
-          <a:noFill/>
-        </p:spPr>
-        <p:txBody>
-          <a:bodyPr wrap="square" rtlCol="0">
-            <a:spAutoFit/>
-          </a:bodyPr>
-          <a:lstStyle/>
-          <a:p>
-            <a:pPr algn="ctr"/>
-            <a:r>
-              <a:rPr lang="en-GB" sz="900" dirty="0">
-                <a:solidFill>
-                  <a:schemeClr val="accent1"/>
-                </a:solidFill>
-              </a:rPr>
-              <a:t>Python uses Flask framework to render data into HTML templates </a:t>
-            </a:r>
-          </a:p>
-        </p:txBody>
-      </p:sp>
-      <p:sp>
-        <p:nvSpPr>
-          <p:cNvPr id="36" name="TextBox 35">
-            <a:extLst>
-              <a:ext uri="{FF2B5EF4-FFF2-40B4-BE49-F238E27FC236}">
-                <a16:creationId xmlns:a16="http://schemas.microsoft.com/office/drawing/2014/main" id="{49825D1B-FBA8-48D5-BE16-819B43EAE83F}"/>
-              </a:ext>
-            </a:extLst>
-          </p:cNvPr>
-          <p:cNvSpPr txBox="1"/>
-          <p:nvPr/>
-        </p:nvSpPr>
-        <p:spPr>
-          <a:xfrm>
-            <a:off x="6815583" y="1664445"/>
-            <a:ext cx="1908286" cy="646331"/>
-          </a:xfrm>
-          <a:prstGeom prst="rect">
-            <a:avLst/>
-          </a:prstGeom>
-          <a:noFill/>
-        </p:spPr>
-        <p:txBody>
-          <a:bodyPr wrap="square" rtlCol="0">
-            <a:spAutoFit/>
-          </a:bodyPr>
-          <a:lstStyle/>
-          <a:p>
-            <a:pPr algn="ctr"/>
-            <a:r>
-              <a:rPr lang="en-GB" sz="900" dirty="0">
-                <a:solidFill>
-                  <a:schemeClr val="accent1"/>
-                </a:solidFill>
-              </a:rPr>
-              <a:t>HTML Templates create page structure for data collected by Python Code and are presented by Flask</a:t>
-            </a:r>
-          </a:p>
-        </p:txBody>
-      </p:sp>
-      <p:sp>
-        <p:nvSpPr>
-          <p:cNvPr id="37" name="TextBox 36">
-            <a:extLst>
-              <a:ext uri="{FF2B5EF4-FFF2-40B4-BE49-F238E27FC236}">
-                <a16:creationId xmlns:a16="http://schemas.microsoft.com/office/drawing/2014/main" id="{55AE60DA-24D3-47D6-B5F2-4EE5382CADC3}"/>
-              </a:ext>
-            </a:extLst>
-          </p:cNvPr>
-          <p:cNvSpPr txBox="1"/>
-          <p:nvPr/>
-        </p:nvSpPr>
-        <p:spPr>
-          <a:xfrm>
-            <a:off x="9196574" y="1741384"/>
-            <a:ext cx="1908286" cy="369332"/>
-          </a:xfrm>
-          <a:prstGeom prst="rect">
-            <a:avLst/>
-          </a:prstGeom>
-          <a:noFill/>
-        </p:spPr>
-        <p:txBody>
-          <a:bodyPr wrap="square" rtlCol="0">
-            <a:spAutoFit/>
-          </a:bodyPr>
-          <a:lstStyle/>
-          <a:p>
-            <a:pPr algn="ctr"/>
-            <a:r>
-              <a:rPr lang="en-GB" sz="900" dirty="0">
-                <a:solidFill>
-                  <a:schemeClr val="accent1"/>
-                </a:solidFill>
-              </a:rPr>
-              <a:t>Python Code uses API calls to transfer data to and from Trello  </a:t>
-            </a:r>
-          </a:p>
-        </p:txBody>
-      </p:sp>
-      <p:sp>
-        <p:nvSpPr>
-          <p:cNvPr id="38" name="TextBox 37">
-            <a:extLst>
-              <a:ext uri="{FF2B5EF4-FFF2-40B4-BE49-F238E27FC236}">
-                <a16:creationId xmlns:a16="http://schemas.microsoft.com/office/drawing/2014/main" id="{ABD4FAD9-662B-4788-86C2-ADC8D246C51C}"/>
-              </a:ext>
-            </a:extLst>
-          </p:cNvPr>
-          <p:cNvSpPr txBox="1"/>
-          <p:nvPr/>
-        </p:nvSpPr>
-        <p:spPr>
-          <a:xfrm>
-            <a:off x="10695638" y="4246808"/>
-            <a:ext cx="1221888" cy="646331"/>
-          </a:xfrm>
-          <a:prstGeom prst="rect">
-            <a:avLst/>
-          </a:prstGeom>
-          <a:noFill/>
-        </p:spPr>
-        <p:txBody>
-          <a:bodyPr wrap="square" rtlCol="0">
-            <a:spAutoFit/>
-          </a:bodyPr>
-          <a:lstStyle/>
-          <a:p>
-            <a:pPr algn="ctr"/>
-            <a:r>
-              <a:rPr lang="en-GB" sz="900" dirty="0">
-                <a:solidFill>
-                  <a:srgbClr val="7030A0"/>
-                </a:solidFill>
-              </a:rPr>
-              <a:t>API calls GET, POST, PUT, PATCH, DELETE data between To-Do App and Trello</a:t>
-            </a:r>
-          </a:p>
-        </p:txBody>
-      </p:sp>
-      <p:sp>
-        <p:nvSpPr>
-          <p:cNvPr id="47" name="TextBox 46">
-            <a:extLst>
-              <a:ext uri="{FF2B5EF4-FFF2-40B4-BE49-F238E27FC236}">
-                <a16:creationId xmlns:a16="http://schemas.microsoft.com/office/drawing/2014/main" id="{791238ED-FACF-4A40-84F1-3629B6D43A03}"/>
-              </a:ext>
-            </a:extLst>
-          </p:cNvPr>
-          <p:cNvSpPr txBox="1"/>
-          <p:nvPr/>
-        </p:nvSpPr>
-        <p:spPr>
-          <a:xfrm>
-            <a:off x="9291032" y="4193640"/>
-            <a:ext cx="1333506" cy="507831"/>
-          </a:xfrm>
-          <a:prstGeom prst="rect">
-            <a:avLst/>
-          </a:prstGeom>
-          <a:noFill/>
-        </p:spPr>
-        <p:txBody>
-          <a:bodyPr wrap="square" rtlCol="0">
-            <a:spAutoFit/>
-          </a:bodyPr>
-          <a:lstStyle/>
-          <a:p>
-            <a:pPr algn="ctr"/>
-            <a:r>
-              <a:rPr lang="en-GB" sz="900" dirty="0">
-                <a:solidFill>
-                  <a:schemeClr val="accent1"/>
-                </a:solidFill>
-              </a:rPr>
-              <a:t>Data transactions handled from API requests </a:t>
-            </a:r>
           </a:p>
         </p:txBody>
       </p:sp>
@@ -8041,68 +7346,6 @@
       </p:sp>
       <p:sp>
         <p:nvSpPr>
-          <p:cNvPr id="49" name="TextBox 48">
-            <a:extLst>
-              <a:ext uri="{FF2B5EF4-FFF2-40B4-BE49-F238E27FC236}">
-                <a16:creationId xmlns:a16="http://schemas.microsoft.com/office/drawing/2014/main" id="{D18C194A-41BE-4010-93B7-E090867B3429}"/>
-              </a:ext>
-            </a:extLst>
-          </p:cNvPr>
-          <p:cNvSpPr txBox="1"/>
-          <p:nvPr/>
-        </p:nvSpPr>
-        <p:spPr>
-          <a:xfrm>
-            <a:off x="8453719" y="5422261"/>
-            <a:ext cx="1528222" cy="984885"/>
-          </a:xfrm>
-          <a:prstGeom prst="rect">
-            <a:avLst/>
-          </a:prstGeom>
-          <a:noFill/>
-        </p:spPr>
-        <p:txBody>
-          <a:bodyPr wrap="square" rtlCol="0">
-            <a:spAutoFit/>
-          </a:bodyPr>
-          <a:lstStyle/>
-          <a:p>
-            <a:pPr algn="ctr"/>
-            <a:r>
-              <a:rPr lang="en-GB" sz="1200" b="1" i="1" dirty="0">
-                <a:solidFill>
-                  <a:schemeClr val="bg1"/>
-                </a:solidFill>
-              </a:rPr>
-              <a:t>Unknown</a:t>
-            </a:r>
-          </a:p>
-          <a:p>
-            <a:pPr algn="ctr"/>
-            <a:r>
-              <a:rPr lang="en-GB" sz="1200" b="1" i="1" dirty="0">
-                <a:solidFill>
-                  <a:schemeClr val="bg1"/>
-                </a:solidFill>
-              </a:rPr>
-              <a:t>Web Application Framework</a:t>
-            </a:r>
-          </a:p>
-          <a:p>
-            <a:pPr algn="ctr"/>
-            <a:r>
-              <a:rPr lang="en-GB" sz="1100" i="1" dirty="0">
-                <a:solidFill>
-                  <a:srgbClr val="002060"/>
-                </a:solidFill>
-              </a:rPr>
-              <a:t>Controls common web operations for Trello</a:t>
-            </a:r>
-          </a:p>
-        </p:txBody>
-      </p:sp>
-      <p:sp>
-        <p:nvSpPr>
           <p:cNvPr id="50" name="Arc 49">
             <a:extLst>
               <a:ext uri="{FF2B5EF4-FFF2-40B4-BE49-F238E27FC236}">
@@ -8213,12 +7456,1957 @@
           </a:p>
         </p:txBody>
       </p:sp>
-      <p:sp>
-        <p:nvSpPr>
-          <p:cNvPr id="52" name="TextBox 51">
-            <a:extLst>
-              <a:ext uri="{FF2B5EF4-FFF2-40B4-BE49-F238E27FC236}">
-                <a16:creationId xmlns:a16="http://schemas.microsoft.com/office/drawing/2014/main" id="{76B6BA84-12B5-4455-81E1-6311F9DFA42F}"/>
+      <p:grpSp>
+        <p:nvGrpSpPr>
+          <p:cNvPr id="4" name="Group 3">
+            <a:extLst>
+              <a:ext uri="{FF2B5EF4-FFF2-40B4-BE49-F238E27FC236}">
+                <a16:creationId xmlns:a16="http://schemas.microsoft.com/office/drawing/2014/main" id="{A7CAC787-B287-4104-AEC1-F05BA8634D99}"/>
+              </a:ext>
+            </a:extLst>
+          </p:cNvPr>
+          <p:cNvGrpSpPr/>
+          <p:nvPr/>
+        </p:nvGrpSpPr>
+        <p:grpSpPr>
+          <a:xfrm>
+            <a:off x="1826534" y="925615"/>
+            <a:ext cx="1194263" cy="1057309"/>
+            <a:chOff x="546047" y="633379"/>
+            <a:chExt cx="3590364" cy="3026408"/>
+          </a:xfrm>
+        </p:grpSpPr>
+        <p:pic>
+          <p:nvPicPr>
+            <p:cNvPr id="14" name="Graphic 13" descr="Internet">
+              <a:extLst>
+                <a:ext uri="{FF2B5EF4-FFF2-40B4-BE49-F238E27FC236}">
+                  <a16:creationId xmlns:a16="http://schemas.microsoft.com/office/drawing/2014/main" id="{21A7DE95-923B-4413-855D-3EC3B356424A}"/>
+                </a:ext>
+              </a:extLst>
+            </p:cNvPr>
+            <p:cNvPicPr>
+              <a:picLocks noChangeAspect="1"/>
+            </p:cNvPicPr>
+            <p:nvPr/>
+          </p:nvPicPr>
+          <p:blipFill>
+            <a:blip r:embed="rId4">
+              <a:extLst>
+                <a:ext uri="{28A0092B-C50C-407E-A947-70E740481C1C}">
+                  <a14:useLocalDpi xmlns:a14="http://schemas.microsoft.com/office/drawing/2010/main" val="0"/>
+                </a:ext>
+                <a:ext uri="{96DAC541-7B7A-43D3-8B79-37D633B846F1}">
+                  <asvg:svgBlip xmlns:asvg="http://schemas.microsoft.com/office/drawing/2016/SVG/main" r:embed="rId5"/>
+                </a:ext>
+              </a:extLst>
+            </a:blip>
+            <a:stretch>
+              <a:fillRect/>
+            </a:stretch>
+          </p:blipFill>
+          <p:spPr>
+            <a:xfrm>
+              <a:off x="716948" y="1703657"/>
+              <a:ext cx="1732156" cy="1732156"/>
+            </a:xfrm>
+            <a:prstGeom prst="rect">
+              <a:avLst/>
+            </a:prstGeom>
+          </p:spPr>
+        </p:pic>
+        <p:sp>
+          <p:nvSpPr>
+            <p:cNvPr id="15" name="Rectangle: Rounded Corners 14">
+              <a:extLst>
+                <a:ext uri="{FF2B5EF4-FFF2-40B4-BE49-F238E27FC236}">
+                  <a16:creationId xmlns:a16="http://schemas.microsoft.com/office/drawing/2014/main" id="{ED210875-8A99-46B1-B897-33BB0E924941}"/>
+                </a:ext>
+              </a:extLst>
+            </p:cNvPr>
+            <p:cNvSpPr/>
+            <p:nvPr/>
+          </p:nvSpPr>
+          <p:spPr>
+            <a:xfrm>
+              <a:off x="546047" y="1518991"/>
+              <a:ext cx="3419463" cy="2140796"/>
+            </a:xfrm>
+            <a:prstGeom prst="roundRect">
+              <a:avLst/>
+            </a:prstGeom>
+            <a:noFill/>
+            <a:ln>
+              <a:solidFill>
+                <a:schemeClr val="accent2">
+                  <a:lumMod val="75000"/>
+                </a:schemeClr>
+              </a:solidFill>
+              <a:prstDash val="sysDot"/>
+            </a:ln>
+          </p:spPr>
+          <p:style>
+            <a:lnRef idx="2">
+              <a:schemeClr val="accent1">
+                <a:shade val="50000"/>
+              </a:schemeClr>
+            </a:lnRef>
+            <a:fillRef idx="1">
+              <a:schemeClr val="accent1"/>
+            </a:fillRef>
+            <a:effectRef idx="0">
+              <a:schemeClr val="accent1"/>
+            </a:effectRef>
+            <a:fontRef idx="minor">
+              <a:schemeClr val="lt1"/>
+            </a:fontRef>
+          </p:style>
+          <p:txBody>
+            <a:bodyPr rtlCol="0" anchor="t"/>
+            <a:lstStyle/>
+            <a:p>
+              <a:r>
+                <a:rPr lang="en-GB" sz="600" dirty="0">
+                  <a:solidFill>
+                    <a:srgbClr val="002060"/>
+                  </a:solidFill>
+                </a:rPr>
+                <a:t>Local Machine</a:t>
+              </a:r>
+            </a:p>
+          </p:txBody>
+        </p:sp>
+        <p:pic>
+          <p:nvPicPr>
+            <p:cNvPr id="6" name="Graphic 5" descr="User">
+              <a:extLst>
+                <a:ext uri="{FF2B5EF4-FFF2-40B4-BE49-F238E27FC236}">
+                  <a16:creationId xmlns:a16="http://schemas.microsoft.com/office/drawing/2014/main" id="{6A79A9BF-DC65-4D5F-9965-C01AD01298DA}"/>
+                </a:ext>
+              </a:extLst>
+            </p:cNvPr>
+            <p:cNvPicPr>
+              <a:picLocks noChangeAspect="1"/>
+            </p:cNvPicPr>
+            <p:nvPr/>
+          </p:nvPicPr>
+          <p:blipFill>
+            <a:blip r:embed="rId6">
+              <a:extLst>
+                <a:ext uri="{28A0092B-C50C-407E-A947-70E740481C1C}">
+                  <a14:useLocalDpi xmlns:a14="http://schemas.microsoft.com/office/drawing/2010/main" val="0"/>
+                </a:ext>
+                <a:ext uri="{96DAC541-7B7A-43D3-8B79-37D633B846F1}">
+                  <asvg:svgBlip xmlns:asvg="http://schemas.microsoft.com/office/drawing/2016/SVG/main" r:embed="rId7"/>
+                </a:ext>
+              </a:extLst>
+            </a:blip>
+            <a:stretch>
+              <a:fillRect/>
+            </a:stretch>
+          </p:blipFill>
+          <p:spPr>
+            <a:xfrm>
+              <a:off x="2021793" y="633379"/>
+              <a:ext cx="2114618" cy="2114618"/>
+            </a:xfrm>
+            <a:prstGeom prst="rect">
+              <a:avLst/>
+            </a:prstGeom>
+          </p:spPr>
+        </p:pic>
+        <p:sp>
+          <p:nvSpPr>
+            <p:cNvPr id="44" name="Rectangle: Rounded Corners 43">
+              <a:extLst>
+                <a:ext uri="{FF2B5EF4-FFF2-40B4-BE49-F238E27FC236}">
+                  <a16:creationId xmlns:a16="http://schemas.microsoft.com/office/drawing/2014/main" id="{1C453D7F-BAFA-4D02-B5DC-DA1E42C48006}"/>
+                </a:ext>
+              </a:extLst>
+            </p:cNvPr>
+            <p:cNvSpPr/>
+            <p:nvPr/>
+          </p:nvSpPr>
+          <p:spPr>
+            <a:xfrm>
+              <a:off x="1010155" y="2331377"/>
+              <a:ext cx="1138334" cy="270588"/>
+            </a:xfrm>
+            <a:prstGeom prst="roundRect">
+              <a:avLst/>
+            </a:prstGeom>
+          </p:spPr>
+          <p:style>
+            <a:lnRef idx="2">
+              <a:schemeClr val="accent4">
+                <a:shade val="50000"/>
+              </a:schemeClr>
+            </a:lnRef>
+            <a:fillRef idx="1">
+              <a:schemeClr val="accent4"/>
+            </a:fillRef>
+            <a:effectRef idx="0">
+              <a:schemeClr val="accent4"/>
+            </a:effectRef>
+            <a:fontRef idx="minor">
+              <a:schemeClr val="lt1"/>
+            </a:fontRef>
+          </p:style>
+          <p:txBody>
+            <a:bodyPr rtlCol="0" anchor="ctr"/>
+            <a:lstStyle/>
+            <a:p>
+              <a:pPr algn="ctr"/>
+              <a:r>
+                <a:rPr lang="en-GB" sz="400" b="1" dirty="0"/>
+                <a:t>Browser</a:t>
+              </a:r>
+            </a:p>
+          </p:txBody>
+        </p:sp>
+      </p:grpSp>
+      <p:cxnSp>
+        <p:nvCxnSpPr>
+          <p:cNvPr id="10" name="Straight Connector 9">
+            <a:extLst>
+              <a:ext uri="{FF2B5EF4-FFF2-40B4-BE49-F238E27FC236}">
+                <a16:creationId xmlns:a16="http://schemas.microsoft.com/office/drawing/2014/main" id="{DF776391-9CE9-443A-AD82-C2A53E68C64E}"/>
+              </a:ext>
+            </a:extLst>
+          </p:cNvPr>
+          <p:cNvCxnSpPr>
+            <a:stCxn id="30" idx="2"/>
+          </p:cNvCxnSpPr>
+          <p:nvPr/>
+        </p:nvCxnSpPr>
+        <p:spPr>
+          <a:xfrm>
+            <a:off x="3590081" y="1928672"/>
+            <a:ext cx="0" cy="2218574"/>
+          </a:xfrm>
+          <a:prstGeom prst="line">
+            <a:avLst/>
+          </a:prstGeom>
+          <a:ln>
+            <a:solidFill>
+              <a:schemeClr val="tx1">
+                <a:lumMod val="95000"/>
+                <a:lumOff val="5000"/>
+              </a:schemeClr>
+            </a:solidFill>
+            <a:prstDash val="dash"/>
+          </a:ln>
+        </p:spPr>
+        <p:style>
+          <a:lnRef idx="1">
+            <a:schemeClr val="accent1"/>
+          </a:lnRef>
+          <a:fillRef idx="0">
+            <a:schemeClr val="accent1"/>
+          </a:fillRef>
+          <a:effectRef idx="0">
+            <a:schemeClr val="accent1"/>
+          </a:effectRef>
+          <a:fontRef idx="minor">
+            <a:schemeClr val="tx1"/>
+          </a:fontRef>
+        </p:style>
+      </p:cxnSp>
+      <p:cxnSp>
+        <p:nvCxnSpPr>
+          <p:cNvPr id="67" name="Straight Connector 66">
+            <a:extLst>
+              <a:ext uri="{FF2B5EF4-FFF2-40B4-BE49-F238E27FC236}">
+                <a16:creationId xmlns:a16="http://schemas.microsoft.com/office/drawing/2014/main" id="{6C881231-6C87-4233-BE0E-602B186C35A2}"/>
+              </a:ext>
+            </a:extLst>
+          </p:cNvPr>
+          <p:cNvCxnSpPr/>
+          <p:nvPr/>
+        </p:nvCxnSpPr>
+        <p:spPr>
+          <a:xfrm>
+            <a:off x="5138415" y="1922160"/>
+            <a:ext cx="0" cy="2218574"/>
+          </a:xfrm>
+          <a:prstGeom prst="line">
+            <a:avLst/>
+          </a:prstGeom>
+          <a:ln>
+            <a:solidFill>
+              <a:schemeClr val="tx1">
+                <a:lumMod val="95000"/>
+                <a:lumOff val="5000"/>
+              </a:schemeClr>
+            </a:solidFill>
+            <a:prstDash val="dash"/>
+          </a:ln>
+        </p:spPr>
+        <p:style>
+          <a:lnRef idx="1">
+            <a:schemeClr val="accent1"/>
+          </a:lnRef>
+          <a:fillRef idx="0">
+            <a:schemeClr val="accent1"/>
+          </a:fillRef>
+          <a:effectRef idx="0">
+            <a:schemeClr val="accent1"/>
+          </a:effectRef>
+          <a:fontRef idx="minor">
+            <a:schemeClr val="tx1"/>
+          </a:fontRef>
+        </p:style>
+      </p:cxnSp>
+      <p:cxnSp>
+        <p:nvCxnSpPr>
+          <p:cNvPr id="68" name="Straight Connector 67">
+            <a:extLst>
+              <a:ext uri="{FF2B5EF4-FFF2-40B4-BE49-F238E27FC236}">
+                <a16:creationId xmlns:a16="http://schemas.microsoft.com/office/drawing/2014/main" id="{CE7EA369-09B0-4441-9F02-8E76D9DE9EBA}"/>
+              </a:ext>
+            </a:extLst>
+          </p:cNvPr>
+          <p:cNvCxnSpPr/>
+          <p:nvPr/>
+        </p:nvCxnSpPr>
+        <p:spPr>
+          <a:xfrm>
+            <a:off x="6712269" y="1928672"/>
+            <a:ext cx="0" cy="2218574"/>
+          </a:xfrm>
+          <a:prstGeom prst="line">
+            <a:avLst/>
+          </a:prstGeom>
+          <a:ln>
+            <a:solidFill>
+              <a:schemeClr val="tx1">
+                <a:lumMod val="95000"/>
+                <a:lumOff val="5000"/>
+              </a:schemeClr>
+            </a:solidFill>
+            <a:prstDash val="dash"/>
+          </a:ln>
+        </p:spPr>
+        <p:style>
+          <a:lnRef idx="1">
+            <a:schemeClr val="accent1"/>
+          </a:lnRef>
+          <a:fillRef idx="0">
+            <a:schemeClr val="accent1"/>
+          </a:fillRef>
+          <a:effectRef idx="0">
+            <a:schemeClr val="accent1"/>
+          </a:effectRef>
+          <a:fontRef idx="minor">
+            <a:schemeClr val="tx1"/>
+          </a:fontRef>
+        </p:style>
+      </p:cxnSp>
+      <p:cxnSp>
+        <p:nvCxnSpPr>
+          <p:cNvPr id="69" name="Straight Connector 68">
+            <a:extLst>
+              <a:ext uri="{FF2B5EF4-FFF2-40B4-BE49-F238E27FC236}">
+                <a16:creationId xmlns:a16="http://schemas.microsoft.com/office/drawing/2014/main" id="{7F7BA359-A807-4013-8B19-EBAD4CD2CAF7}"/>
+              </a:ext>
+            </a:extLst>
+          </p:cNvPr>
+          <p:cNvCxnSpPr/>
+          <p:nvPr/>
+        </p:nvCxnSpPr>
+        <p:spPr>
+          <a:xfrm>
+            <a:off x="9788839" y="1928672"/>
+            <a:ext cx="0" cy="2218574"/>
+          </a:xfrm>
+          <a:prstGeom prst="line">
+            <a:avLst/>
+          </a:prstGeom>
+          <a:ln>
+            <a:solidFill>
+              <a:schemeClr val="tx1">
+                <a:lumMod val="95000"/>
+                <a:lumOff val="5000"/>
+              </a:schemeClr>
+            </a:solidFill>
+            <a:prstDash val="dash"/>
+          </a:ln>
+        </p:spPr>
+        <p:style>
+          <a:lnRef idx="1">
+            <a:schemeClr val="accent1"/>
+          </a:lnRef>
+          <a:fillRef idx="0">
+            <a:schemeClr val="accent1"/>
+          </a:fillRef>
+          <a:effectRef idx="0">
+            <a:schemeClr val="accent1"/>
+          </a:effectRef>
+          <a:fontRef idx="minor">
+            <a:schemeClr val="tx1"/>
+          </a:fontRef>
+        </p:style>
+      </p:cxnSp>
+      <p:cxnSp>
+        <p:nvCxnSpPr>
+          <p:cNvPr id="12" name="Straight Arrow Connector 11">
+            <a:extLst>
+              <a:ext uri="{FF2B5EF4-FFF2-40B4-BE49-F238E27FC236}">
+                <a16:creationId xmlns:a16="http://schemas.microsoft.com/office/drawing/2014/main" id="{9FB52A6A-2B2D-46F3-8A0C-ECEB8A3EAD3E}"/>
+              </a:ext>
+            </a:extLst>
+          </p:cNvPr>
+          <p:cNvCxnSpPr/>
+          <p:nvPr/>
+        </p:nvCxnSpPr>
+        <p:spPr>
+          <a:xfrm>
+            <a:off x="3590081" y="2218141"/>
+            <a:ext cx="1548334" cy="0"/>
+          </a:xfrm>
+          <a:prstGeom prst="straightConnector1">
+            <a:avLst/>
+          </a:prstGeom>
+          <a:ln>
+            <a:solidFill>
+              <a:schemeClr val="tx1">
+                <a:lumMod val="95000"/>
+                <a:lumOff val="5000"/>
+              </a:schemeClr>
+            </a:solidFill>
+            <a:tailEnd type="triangle"/>
+          </a:ln>
+        </p:spPr>
+        <p:style>
+          <a:lnRef idx="1">
+            <a:schemeClr val="accent1"/>
+          </a:lnRef>
+          <a:fillRef idx="0">
+            <a:schemeClr val="accent1"/>
+          </a:fillRef>
+          <a:effectRef idx="0">
+            <a:schemeClr val="accent1"/>
+          </a:effectRef>
+          <a:fontRef idx="minor">
+            <a:schemeClr val="tx1"/>
+          </a:fontRef>
+        </p:style>
+      </p:cxnSp>
+      <p:cxnSp>
+        <p:nvCxnSpPr>
+          <p:cNvPr id="70" name="Straight Arrow Connector 69">
+            <a:extLst>
+              <a:ext uri="{FF2B5EF4-FFF2-40B4-BE49-F238E27FC236}">
+                <a16:creationId xmlns:a16="http://schemas.microsoft.com/office/drawing/2014/main" id="{6CAC73E3-BB6E-4562-B82D-D6F59BAB6133}"/>
+              </a:ext>
+            </a:extLst>
+          </p:cNvPr>
+          <p:cNvCxnSpPr>
+            <a:cxnSpLocks/>
+            <a:endCxn id="64" idx="1"/>
+          </p:cNvCxnSpPr>
+          <p:nvPr/>
+        </p:nvCxnSpPr>
+        <p:spPr>
+          <a:xfrm>
+            <a:off x="5133801" y="2315620"/>
+            <a:ext cx="2363842" cy="779"/>
+          </a:xfrm>
+          <a:prstGeom prst="straightConnector1">
+            <a:avLst/>
+          </a:prstGeom>
+          <a:ln>
+            <a:solidFill>
+              <a:schemeClr val="tx1">
+                <a:lumMod val="95000"/>
+                <a:lumOff val="5000"/>
+              </a:schemeClr>
+            </a:solidFill>
+            <a:tailEnd type="triangle"/>
+          </a:ln>
+        </p:spPr>
+        <p:style>
+          <a:lnRef idx="1">
+            <a:schemeClr val="accent1"/>
+          </a:lnRef>
+          <a:fillRef idx="0">
+            <a:schemeClr val="accent1"/>
+          </a:fillRef>
+          <a:effectRef idx="0">
+            <a:schemeClr val="accent1"/>
+          </a:effectRef>
+          <a:fontRef idx="minor">
+            <a:schemeClr val="tx1"/>
+          </a:fontRef>
+        </p:style>
+      </p:cxnSp>
+      <p:cxnSp>
+        <p:nvCxnSpPr>
+          <p:cNvPr id="71" name="Straight Connector 70">
+            <a:extLst>
+              <a:ext uri="{FF2B5EF4-FFF2-40B4-BE49-F238E27FC236}">
+                <a16:creationId xmlns:a16="http://schemas.microsoft.com/office/drawing/2014/main" id="{EC93BC0D-91A3-44F7-8E16-6B81FEA5D33B}"/>
+              </a:ext>
+            </a:extLst>
+          </p:cNvPr>
+          <p:cNvCxnSpPr>
+            <a:cxnSpLocks/>
+            <a:stCxn id="64" idx="2"/>
+          </p:cNvCxnSpPr>
+          <p:nvPr/>
+        </p:nvCxnSpPr>
+        <p:spPr>
+          <a:xfrm>
+            <a:off x="7744573" y="2402804"/>
+            <a:ext cx="0" cy="1304519"/>
+          </a:xfrm>
+          <a:prstGeom prst="line">
+            <a:avLst/>
+          </a:prstGeom>
+          <a:ln>
+            <a:solidFill>
+              <a:schemeClr val="tx1">
+                <a:lumMod val="95000"/>
+                <a:lumOff val="5000"/>
+              </a:schemeClr>
+            </a:solidFill>
+            <a:prstDash val="dash"/>
+          </a:ln>
+        </p:spPr>
+        <p:style>
+          <a:lnRef idx="1">
+            <a:schemeClr val="accent1"/>
+          </a:lnRef>
+          <a:fillRef idx="0">
+            <a:schemeClr val="accent1"/>
+          </a:fillRef>
+          <a:effectRef idx="0">
+            <a:schemeClr val="accent1"/>
+          </a:effectRef>
+          <a:fontRef idx="minor">
+            <a:schemeClr val="tx1"/>
+          </a:fontRef>
+        </p:style>
+      </p:cxnSp>
+      <p:cxnSp>
+        <p:nvCxnSpPr>
+          <p:cNvPr id="72" name="Straight Connector 71">
+            <a:extLst>
+              <a:ext uri="{FF2B5EF4-FFF2-40B4-BE49-F238E27FC236}">
+                <a16:creationId xmlns:a16="http://schemas.microsoft.com/office/drawing/2014/main" id="{F28A3F9E-E9F0-4642-815A-8960F198E0D1}"/>
+              </a:ext>
+            </a:extLst>
+          </p:cNvPr>
+          <p:cNvCxnSpPr>
+            <a:cxnSpLocks/>
+          </p:cNvCxnSpPr>
+          <p:nvPr/>
+        </p:nvCxnSpPr>
+        <p:spPr>
+          <a:xfrm>
+            <a:off x="2167353" y="1626123"/>
+            <a:ext cx="0" cy="2514611"/>
+          </a:xfrm>
+          <a:prstGeom prst="line">
+            <a:avLst/>
+          </a:prstGeom>
+          <a:ln>
+            <a:solidFill>
+              <a:schemeClr val="tx1">
+                <a:lumMod val="95000"/>
+                <a:lumOff val="5000"/>
+              </a:schemeClr>
+            </a:solidFill>
+            <a:prstDash val="dash"/>
+          </a:ln>
+        </p:spPr>
+        <p:style>
+          <a:lnRef idx="1">
+            <a:schemeClr val="accent1"/>
+          </a:lnRef>
+          <a:fillRef idx="0">
+            <a:schemeClr val="accent1"/>
+          </a:fillRef>
+          <a:effectRef idx="0">
+            <a:schemeClr val="accent1"/>
+          </a:effectRef>
+          <a:fontRef idx="minor">
+            <a:schemeClr val="tx1"/>
+          </a:fontRef>
+        </p:style>
+      </p:cxnSp>
+      <p:cxnSp>
+        <p:nvCxnSpPr>
+          <p:cNvPr id="73" name="Straight Arrow Connector 72">
+            <a:extLst>
+              <a:ext uri="{FF2B5EF4-FFF2-40B4-BE49-F238E27FC236}">
+                <a16:creationId xmlns:a16="http://schemas.microsoft.com/office/drawing/2014/main" id="{D240EEDC-1AC5-4C4F-8CCB-25F2034A3DA3}"/>
+              </a:ext>
+            </a:extLst>
+          </p:cNvPr>
+          <p:cNvCxnSpPr>
+            <a:cxnSpLocks/>
+          </p:cNvCxnSpPr>
+          <p:nvPr/>
+        </p:nvCxnSpPr>
+        <p:spPr>
+          <a:xfrm>
+            <a:off x="2167353" y="2140229"/>
+            <a:ext cx="1422728" cy="0"/>
+          </a:xfrm>
+          <a:prstGeom prst="straightConnector1">
+            <a:avLst/>
+          </a:prstGeom>
+          <a:ln>
+            <a:solidFill>
+              <a:schemeClr val="tx1">
+                <a:lumMod val="95000"/>
+                <a:lumOff val="5000"/>
+              </a:schemeClr>
+            </a:solidFill>
+            <a:tailEnd type="triangle"/>
+          </a:ln>
+        </p:spPr>
+        <p:style>
+          <a:lnRef idx="1">
+            <a:schemeClr val="accent1"/>
+          </a:lnRef>
+          <a:fillRef idx="0">
+            <a:schemeClr val="accent1"/>
+          </a:fillRef>
+          <a:effectRef idx="0">
+            <a:schemeClr val="accent1"/>
+          </a:effectRef>
+          <a:fontRef idx="minor">
+            <a:schemeClr val="tx1"/>
+          </a:fontRef>
+        </p:style>
+      </p:cxnSp>
+      <p:sp>
+        <p:nvSpPr>
+          <p:cNvPr id="64" name="Rectangle: Rounded Corners 63">
+            <a:extLst>
+              <a:ext uri="{FF2B5EF4-FFF2-40B4-BE49-F238E27FC236}">
+                <a16:creationId xmlns:a16="http://schemas.microsoft.com/office/drawing/2014/main" id="{CD9B23EE-84B2-4BD0-A4D3-71475EE44268}"/>
+              </a:ext>
+            </a:extLst>
+          </p:cNvPr>
+          <p:cNvSpPr/>
+          <p:nvPr/>
+        </p:nvSpPr>
+        <p:spPr>
+          <a:xfrm>
+            <a:off x="7497643" y="2229994"/>
+            <a:ext cx="493860" cy="172810"/>
+          </a:xfrm>
+          <a:prstGeom prst="roundRect">
+            <a:avLst/>
+          </a:prstGeom>
+          <a:solidFill>
+            <a:schemeClr val="accent3">
+              <a:lumMod val="75000"/>
+            </a:schemeClr>
+          </a:solidFill>
+        </p:spPr>
+        <p:style>
+          <a:lnRef idx="2">
+            <a:schemeClr val="accent4">
+              <a:shade val="50000"/>
+            </a:schemeClr>
+          </a:lnRef>
+          <a:fillRef idx="1">
+            <a:schemeClr val="accent4"/>
+          </a:fillRef>
+          <a:effectRef idx="0">
+            <a:schemeClr val="accent4"/>
+          </a:effectRef>
+          <a:fontRef idx="minor">
+            <a:schemeClr val="lt1"/>
+          </a:fontRef>
+        </p:style>
+        <p:txBody>
+          <a:bodyPr rtlCol="0" anchor="ctr"/>
+          <a:lstStyle/>
+          <a:p>
+            <a:pPr algn="ctr"/>
+            <a:r>
+              <a:rPr lang="en-GB" sz="500" b="1" dirty="0"/>
+              <a:t>flask</a:t>
+            </a:r>
+          </a:p>
+        </p:txBody>
+      </p:sp>
+      <p:sp>
+        <p:nvSpPr>
+          <p:cNvPr id="63" name="Rectangle: Rounded Corners 62">
+            <a:extLst>
+              <a:ext uri="{FF2B5EF4-FFF2-40B4-BE49-F238E27FC236}">
+                <a16:creationId xmlns:a16="http://schemas.microsoft.com/office/drawing/2014/main" id="{D50F7513-C0A5-4A2C-A28C-F4D0BD1121C9}"/>
+              </a:ext>
+            </a:extLst>
+          </p:cNvPr>
+          <p:cNvSpPr/>
+          <p:nvPr/>
+        </p:nvSpPr>
+        <p:spPr>
+          <a:xfrm>
+            <a:off x="7995938" y="2229994"/>
+            <a:ext cx="493860" cy="172810"/>
+          </a:xfrm>
+          <a:prstGeom prst="roundRect">
+            <a:avLst/>
+          </a:prstGeom>
+          <a:solidFill>
+            <a:schemeClr val="accent3">
+              <a:lumMod val="75000"/>
+            </a:schemeClr>
+          </a:solidFill>
+        </p:spPr>
+        <p:style>
+          <a:lnRef idx="2">
+            <a:schemeClr val="accent4">
+              <a:shade val="50000"/>
+            </a:schemeClr>
+          </a:lnRef>
+          <a:fillRef idx="1">
+            <a:schemeClr val="accent4"/>
+          </a:fillRef>
+          <a:effectRef idx="0">
+            <a:schemeClr val="accent4"/>
+          </a:effectRef>
+          <a:fontRef idx="minor">
+            <a:schemeClr val="lt1"/>
+          </a:fontRef>
+        </p:style>
+        <p:txBody>
+          <a:bodyPr rtlCol="0" anchor="ctr"/>
+          <a:lstStyle/>
+          <a:p>
+            <a:pPr algn="ctr"/>
+            <a:r>
+              <a:rPr lang="en-GB" sz="500" b="1" dirty="0"/>
+              <a:t>json</a:t>
+            </a:r>
+          </a:p>
+        </p:txBody>
+      </p:sp>
+      <p:sp>
+        <p:nvSpPr>
+          <p:cNvPr id="65" name="Rectangle: Rounded Corners 64">
+            <a:extLst>
+              <a:ext uri="{FF2B5EF4-FFF2-40B4-BE49-F238E27FC236}">
+                <a16:creationId xmlns:a16="http://schemas.microsoft.com/office/drawing/2014/main" id="{F4A21CBD-7201-48F6-98DC-9EA4E947BEDC}"/>
+              </a:ext>
+            </a:extLst>
+          </p:cNvPr>
+          <p:cNvSpPr/>
+          <p:nvPr/>
+        </p:nvSpPr>
+        <p:spPr>
+          <a:xfrm>
+            <a:off x="8489798" y="2229777"/>
+            <a:ext cx="493860" cy="172810"/>
+          </a:xfrm>
+          <a:prstGeom prst="roundRect">
+            <a:avLst/>
+          </a:prstGeom>
+          <a:solidFill>
+            <a:schemeClr val="accent3">
+              <a:lumMod val="75000"/>
+            </a:schemeClr>
+          </a:solidFill>
+        </p:spPr>
+        <p:style>
+          <a:lnRef idx="2">
+            <a:schemeClr val="accent4">
+              <a:shade val="50000"/>
+            </a:schemeClr>
+          </a:lnRef>
+          <a:fillRef idx="1">
+            <a:schemeClr val="accent4"/>
+          </a:fillRef>
+          <a:effectRef idx="0">
+            <a:schemeClr val="accent4"/>
+          </a:effectRef>
+          <a:fontRef idx="minor">
+            <a:schemeClr val="lt1"/>
+          </a:fontRef>
+        </p:style>
+        <p:txBody>
+          <a:bodyPr rtlCol="0" anchor="ctr"/>
+          <a:lstStyle/>
+          <a:p>
+            <a:pPr algn="ctr"/>
+            <a:r>
+              <a:rPr lang="en-GB" sz="500" b="1" dirty="0"/>
+              <a:t>requests</a:t>
+            </a:r>
+          </a:p>
+        </p:txBody>
+      </p:sp>
+      <p:sp>
+        <p:nvSpPr>
+          <p:cNvPr id="77" name="Rectangle: Rounded Corners 76">
+            <a:extLst>
+              <a:ext uri="{FF2B5EF4-FFF2-40B4-BE49-F238E27FC236}">
+                <a16:creationId xmlns:a16="http://schemas.microsoft.com/office/drawing/2014/main" id="{97EDBDFE-B969-4393-B9EB-BB400A0E66A1}"/>
+              </a:ext>
+            </a:extLst>
+          </p:cNvPr>
+          <p:cNvSpPr/>
+          <p:nvPr/>
+        </p:nvSpPr>
+        <p:spPr>
+          <a:xfrm>
+            <a:off x="7990049" y="1982450"/>
+            <a:ext cx="493860" cy="172810"/>
+          </a:xfrm>
+          <a:prstGeom prst="roundRect">
+            <a:avLst/>
+          </a:prstGeom>
+          <a:solidFill>
+            <a:schemeClr val="accent6">
+              <a:lumMod val="75000"/>
+            </a:schemeClr>
+          </a:solidFill>
+        </p:spPr>
+        <p:style>
+          <a:lnRef idx="2">
+            <a:schemeClr val="accent4">
+              <a:shade val="50000"/>
+            </a:schemeClr>
+          </a:lnRef>
+          <a:fillRef idx="1">
+            <a:schemeClr val="accent4"/>
+          </a:fillRef>
+          <a:effectRef idx="0">
+            <a:schemeClr val="accent4"/>
+          </a:effectRef>
+          <a:fontRef idx="minor">
+            <a:schemeClr val="lt1"/>
+          </a:fontRef>
+        </p:style>
+        <p:txBody>
+          <a:bodyPr rtlCol="0" anchor="ctr"/>
+          <a:lstStyle/>
+          <a:p>
+            <a:pPr algn="ctr"/>
+            <a:r>
+              <a:rPr lang="en-GB" sz="300" b="1" dirty="0"/>
+              <a:t>credentials.txt</a:t>
+            </a:r>
+          </a:p>
+        </p:txBody>
+      </p:sp>
+      <p:sp>
+        <p:nvSpPr>
+          <p:cNvPr id="82" name="Rectangle: Rounded Corners 81">
+            <a:extLst>
+              <a:ext uri="{FF2B5EF4-FFF2-40B4-BE49-F238E27FC236}">
+                <a16:creationId xmlns:a16="http://schemas.microsoft.com/office/drawing/2014/main" id="{339063C3-A0C0-4053-B082-940D42FC4851}"/>
+              </a:ext>
+            </a:extLst>
+          </p:cNvPr>
+          <p:cNvSpPr/>
+          <p:nvPr/>
+        </p:nvSpPr>
+        <p:spPr>
+          <a:xfrm>
+            <a:off x="9550460" y="2831547"/>
+            <a:ext cx="493860" cy="172810"/>
+          </a:xfrm>
+          <a:prstGeom prst="roundRect">
+            <a:avLst/>
+          </a:prstGeom>
+          <a:solidFill>
+            <a:schemeClr val="accent2">
+              <a:lumMod val="75000"/>
+            </a:schemeClr>
+          </a:solidFill>
+        </p:spPr>
+        <p:style>
+          <a:lnRef idx="2">
+            <a:schemeClr val="accent4">
+              <a:shade val="50000"/>
+            </a:schemeClr>
+          </a:lnRef>
+          <a:fillRef idx="1">
+            <a:schemeClr val="accent4"/>
+          </a:fillRef>
+          <a:effectRef idx="0">
+            <a:schemeClr val="accent4"/>
+          </a:effectRef>
+          <a:fontRef idx="minor">
+            <a:schemeClr val="lt1"/>
+          </a:fontRef>
+        </p:style>
+        <p:txBody>
+          <a:bodyPr rtlCol="0" anchor="ctr"/>
+          <a:lstStyle/>
+          <a:p>
+            <a:pPr algn="ctr"/>
+            <a:r>
+              <a:rPr lang="en-GB" sz="500" b="1" dirty="0"/>
+              <a:t>GET</a:t>
+            </a:r>
+          </a:p>
+        </p:txBody>
+      </p:sp>
+      <p:cxnSp>
+        <p:nvCxnSpPr>
+          <p:cNvPr id="87" name="Straight Connector 86">
+            <a:extLst>
+              <a:ext uri="{FF2B5EF4-FFF2-40B4-BE49-F238E27FC236}">
+                <a16:creationId xmlns:a16="http://schemas.microsoft.com/office/drawing/2014/main" id="{ACBD2489-EDA5-4F56-85E1-97FA18F91B0C}"/>
+              </a:ext>
+            </a:extLst>
+          </p:cNvPr>
+          <p:cNvCxnSpPr>
+            <a:cxnSpLocks/>
+          </p:cNvCxnSpPr>
+          <p:nvPr/>
+        </p:nvCxnSpPr>
+        <p:spPr>
+          <a:xfrm>
+            <a:off x="8236979" y="2402804"/>
+            <a:ext cx="0" cy="1295624"/>
+          </a:xfrm>
+          <a:prstGeom prst="line">
+            <a:avLst/>
+          </a:prstGeom>
+          <a:ln>
+            <a:solidFill>
+              <a:schemeClr val="tx1">
+                <a:lumMod val="95000"/>
+                <a:lumOff val="5000"/>
+              </a:schemeClr>
+            </a:solidFill>
+            <a:prstDash val="dash"/>
+          </a:ln>
+        </p:spPr>
+        <p:style>
+          <a:lnRef idx="1">
+            <a:schemeClr val="accent1"/>
+          </a:lnRef>
+          <a:fillRef idx="0">
+            <a:schemeClr val="accent1"/>
+          </a:fillRef>
+          <a:effectRef idx="0">
+            <a:schemeClr val="accent1"/>
+          </a:effectRef>
+          <a:fontRef idx="minor">
+            <a:schemeClr val="tx1"/>
+          </a:fontRef>
+        </p:style>
+      </p:cxnSp>
+      <p:cxnSp>
+        <p:nvCxnSpPr>
+          <p:cNvPr id="88" name="Straight Connector 87">
+            <a:extLst>
+              <a:ext uri="{FF2B5EF4-FFF2-40B4-BE49-F238E27FC236}">
+                <a16:creationId xmlns:a16="http://schemas.microsoft.com/office/drawing/2014/main" id="{A11D1226-C0CF-46C9-AD94-60B540059CEF}"/>
+              </a:ext>
+            </a:extLst>
+          </p:cNvPr>
+          <p:cNvCxnSpPr>
+            <a:cxnSpLocks/>
+          </p:cNvCxnSpPr>
+          <p:nvPr/>
+        </p:nvCxnSpPr>
+        <p:spPr>
+          <a:xfrm>
+            <a:off x="8752252" y="2383635"/>
+            <a:ext cx="0" cy="1295624"/>
+          </a:xfrm>
+          <a:prstGeom prst="line">
+            <a:avLst/>
+          </a:prstGeom>
+          <a:ln>
+            <a:solidFill>
+              <a:schemeClr val="tx1">
+                <a:lumMod val="95000"/>
+                <a:lumOff val="5000"/>
+              </a:schemeClr>
+            </a:solidFill>
+            <a:prstDash val="dash"/>
+          </a:ln>
+        </p:spPr>
+        <p:style>
+          <a:lnRef idx="1">
+            <a:schemeClr val="accent1"/>
+          </a:lnRef>
+          <a:fillRef idx="0">
+            <a:schemeClr val="accent1"/>
+          </a:fillRef>
+          <a:effectRef idx="0">
+            <a:schemeClr val="accent1"/>
+          </a:effectRef>
+          <a:fontRef idx="minor">
+            <a:schemeClr val="tx1"/>
+          </a:fontRef>
+        </p:style>
+      </p:cxnSp>
+      <p:cxnSp>
+        <p:nvCxnSpPr>
+          <p:cNvPr id="90" name="Straight Arrow Connector 89">
+            <a:extLst>
+              <a:ext uri="{FF2B5EF4-FFF2-40B4-BE49-F238E27FC236}">
+                <a16:creationId xmlns:a16="http://schemas.microsoft.com/office/drawing/2014/main" id="{17820267-FA6B-4847-B94E-9ACB257AF417}"/>
+              </a:ext>
+            </a:extLst>
+          </p:cNvPr>
+          <p:cNvCxnSpPr>
+            <a:cxnSpLocks/>
+          </p:cNvCxnSpPr>
+          <p:nvPr/>
+        </p:nvCxnSpPr>
+        <p:spPr>
+          <a:xfrm>
+            <a:off x="7744573" y="2501184"/>
+            <a:ext cx="991176" cy="0"/>
+          </a:xfrm>
+          <a:prstGeom prst="straightConnector1">
+            <a:avLst/>
+          </a:prstGeom>
+          <a:ln>
+            <a:solidFill>
+              <a:schemeClr val="tx1">
+                <a:lumMod val="95000"/>
+                <a:lumOff val="5000"/>
+              </a:schemeClr>
+            </a:solidFill>
+            <a:tailEnd type="triangle"/>
+          </a:ln>
+        </p:spPr>
+        <p:style>
+          <a:lnRef idx="1">
+            <a:schemeClr val="accent1"/>
+          </a:lnRef>
+          <a:fillRef idx="0">
+            <a:schemeClr val="accent1"/>
+          </a:fillRef>
+          <a:effectRef idx="0">
+            <a:schemeClr val="accent1"/>
+          </a:effectRef>
+          <a:fontRef idx="minor">
+            <a:schemeClr val="tx1"/>
+          </a:fontRef>
+        </p:style>
+      </p:cxnSp>
+      <p:cxnSp>
+        <p:nvCxnSpPr>
+          <p:cNvPr id="92" name="Straight Arrow Connector 91">
+            <a:extLst>
+              <a:ext uri="{FF2B5EF4-FFF2-40B4-BE49-F238E27FC236}">
+                <a16:creationId xmlns:a16="http://schemas.microsoft.com/office/drawing/2014/main" id="{6A0694A3-D6F0-4744-B884-C0AD4B4508D6}"/>
+              </a:ext>
+            </a:extLst>
+          </p:cNvPr>
+          <p:cNvCxnSpPr>
+            <a:cxnSpLocks/>
+          </p:cNvCxnSpPr>
+          <p:nvPr/>
+        </p:nvCxnSpPr>
+        <p:spPr>
+          <a:xfrm>
+            <a:off x="8735749" y="2587254"/>
+            <a:ext cx="1053090" cy="0"/>
+          </a:xfrm>
+          <a:prstGeom prst="straightConnector1">
+            <a:avLst/>
+          </a:prstGeom>
+          <a:ln>
+            <a:solidFill>
+              <a:schemeClr val="tx1">
+                <a:lumMod val="95000"/>
+                <a:lumOff val="5000"/>
+              </a:schemeClr>
+            </a:solidFill>
+            <a:tailEnd type="triangle"/>
+          </a:ln>
+        </p:spPr>
+        <p:style>
+          <a:lnRef idx="1">
+            <a:schemeClr val="accent1"/>
+          </a:lnRef>
+          <a:fillRef idx="0">
+            <a:schemeClr val="accent1"/>
+          </a:fillRef>
+          <a:effectRef idx="0">
+            <a:schemeClr val="accent1"/>
+          </a:effectRef>
+          <a:fontRef idx="minor">
+            <a:schemeClr val="tx1"/>
+          </a:fontRef>
+        </p:style>
+      </p:cxnSp>
+      <p:cxnSp>
+        <p:nvCxnSpPr>
+          <p:cNvPr id="94" name="Straight Arrow Connector 93">
+            <a:extLst>
+              <a:ext uri="{FF2B5EF4-FFF2-40B4-BE49-F238E27FC236}">
+                <a16:creationId xmlns:a16="http://schemas.microsoft.com/office/drawing/2014/main" id="{33ED599C-642C-4097-954B-BA0A033DA110}"/>
+              </a:ext>
+            </a:extLst>
+          </p:cNvPr>
+          <p:cNvCxnSpPr>
+            <a:cxnSpLocks/>
+          </p:cNvCxnSpPr>
+          <p:nvPr/>
+        </p:nvCxnSpPr>
+        <p:spPr>
+          <a:xfrm flipH="1">
+            <a:off x="8735749" y="2739654"/>
+            <a:ext cx="1053090" cy="0"/>
+          </a:xfrm>
+          <a:prstGeom prst="straightConnector1">
+            <a:avLst/>
+          </a:prstGeom>
+          <a:ln>
+            <a:solidFill>
+              <a:schemeClr val="tx1">
+                <a:lumMod val="95000"/>
+                <a:lumOff val="5000"/>
+              </a:schemeClr>
+            </a:solidFill>
+            <a:tailEnd type="triangle"/>
+          </a:ln>
+        </p:spPr>
+        <p:style>
+          <a:lnRef idx="1">
+            <a:schemeClr val="accent1"/>
+          </a:lnRef>
+          <a:fillRef idx="0">
+            <a:schemeClr val="accent1"/>
+          </a:fillRef>
+          <a:effectRef idx="0">
+            <a:schemeClr val="accent1"/>
+          </a:effectRef>
+          <a:fontRef idx="minor">
+            <a:schemeClr val="tx1"/>
+          </a:fontRef>
+        </p:style>
+      </p:cxnSp>
+      <p:cxnSp>
+        <p:nvCxnSpPr>
+          <p:cNvPr id="97" name="Straight Arrow Connector 96">
+            <a:extLst>
+              <a:ext uri="{FF2B5EF4-FFF2-40B4-BE49-F238E27FC236}">
+                <a16:creationId xmlns:a16="http://schemas.microsoft.com/office/drawing/2014/main" id="{1378FBA2-4972-40C8-A866-990A771619BD}"/>
+              </a:ext>
+            </a:extLst>
+          </p:cNvPr>
+          <p:cNvCxnSpPr>
+            <a:cxnSpLocks/>
+          </p:cNvCxnSpPr>
+          <p:nvPr/>
+        </p:nvCxnSpPr>
+        <p:spPr>
+          <a:xfrm flipH="1">
+            <a:off x="8236979" y="2871196"/>
+            <a:ext cx="498770" cy="0"/>
+          </a:xfrm>
+          <a:prstGeom prst="straightConnector1">
+            <a:avLst/>
+          </a:prstGeom>
+          <a:ln>
+            <a:solidFill>
+              <a:schemeClr val="tx1">
+                <a:lumMod val="95000"/>
+                <a:lumOff val="5000"/>
+              </a:schemeClr>
+            </a:solidFill>
+            <a:tailEnd type="triangle"/>
+          </a:ln>
+        </p:spPr>
+        <p:style>
+          <a:lnRef idx="1">
+            <a:schemeClr val="accent1"/>
+          </a:lnRef>
+          <a:fillRef idx="0">
+            <a:schemeClr val="accent1"/>
+          </a:fillRef>
+          <a:effectRef idx="0">
+            <a:schemeClr val="accent1"/>
+          </a:effectRef>
+          <a:fontRef idx="minor">
+            <a:schemeClr val="tx1"/>
+          </a:fontRef>
+        </p:style>
+      </p:cxnSp>
+      <p:cxnSp>
+        <p:nvCxnSpPr>
+          <p:cNvPr id="99" name="Straight Arrow Connector 98">
+            <a:extLst>
+              <a:ext uri="{FF2B5EF4-FFF2-40B4-BE49-F238E27FC236}">
+                <a16:creationId xmlns:a16="http://schemas.microsoft.com/office/drawing/2014/main" id="{21DE0954-B6F8-40D7-BC0D-B983E9CE2C50}"/>
+              </a:ext>
+            </a:extLst>
+          </p:cNvPr>
+          <p:cNvCxnSpPr>
+            <a:cxnSpLocks/>
+          </p:cNvCxnSpPr>
+          <p:nvPr/>
+        </p:nvCxnSpPr>
+        <p:spPr>
+          <a:xfrm flipH="1">
+            <a:off x="7738209" y="2991663"/>
+            <a:ext cx="498770" cy="0"/>
+          </a:xfrm>
+          <a:prstGeom prst="straightConnector1">
+            <a:avLst/>
+          </a:prstGeom>
+          <a:ln>
+            <a:solidFill>
+              <a:schemeClr val="tx1">
+                <a:lumMod val="95000"/>
+                <a:lumOff val="5000"/>
+              </a:schemeClr>
+            </a:solidFill>
+            <a:tailEnd type="triangle"/>
+          </a:ln>
+        </p:spPr>
+        <p:style>
+          <a:lnRef idx="1">
+            <a:schemeClr val="accent1"/>
+          </a:lnRef>
+          <a:fillRef idx="0">
+            <a:schemeClr val="accent1"/>
+          </a:fillRef>
+          <a:effectRef idx="0">
+            <a:schemeClr val="accent1"/>
+          </a:effectRef>
+          <a:fontRef idx="minor">
+            <a:schemeClr val="tx1"/>
+          </a:fontRef>
+        </p:style>
+      </p:cxnSp>
+      <p:cxnSp>
+        <p:nvCxnSpPr>
+          <p:cNvPr id="100" name="Straight Arrow Connector 99">
+            <a:extLst>
+              <a:ext uri="{FF2B5EF4-FFF2-40B4-BE49-F238E27FC236}">
+                <a16:creationId xmlns:a16="http://schemas.microsoft.com/office/drawing/2014/main" id="{42B03210-A628-41BD-AC54-2E6B64DBE7AD}"/>
+              </a:ext>
+            </a:extLst>
+          </p:cNvPr>
+          <p:cNvCxnSpPr>
+            <a:cxnSpLocks/>
+          </p:cNvCxnSpPr>
+          <p:nvPr/>
+        </p:nvCxnSpPr>
+        <p:spPr>
+          <a:xfrm flipH="1">
+            <a:off x="6712269" y="3133683"/>
+            <a:ext cx="1030281" cy="0"/>
+          </a:xfrm>
+          <a:prstGeom prst="straightConnector1">
+            <a:avLst/>
+          </a:prstGeom>
+          <a:ln>
+            <a:solidFill>
+              <a:schemeClr val="tx1">
+                <a:lumMod val="95000"/>
+                <a:lumOff val="5000"/>
+              </a:schemeClr>
+            </a:solidFill>
+            <a:tailEnd type="triangle"/>
+          </a:ln>
+        </p:spPr>
+        <p:style>
+          <a:lnRef idx="1">
+            <a:schemeClr val="accent1"/>
+          </a:lnRef>
+          <a:fillRef idx="0">
+            <a:schemeClr val="accent1"/>
+          </a:fillRef>
+          <a:effectRef idx="0">
+            <a:schemeClr val="accent1"/>
+          </a:effectRef>
+          <a:fontRef idx="minor">
+            <a:schemeClr val="tx1"/>
+          </a:fontRef>
+        </p:style>
+      </p:cxnSp>
+      <p:cxnSp>
+        <p:nvCxnSpPr>
+          <p:cNvPr id="102" name="Straight Arrow Connector 101">
+            <a:extLst>
+              <a:ext uri="{FF2B5EF4-FFF2-40B4-BE49-F238E27FC236}">
+                <a16:creationId xmlns:a16="http://schemas.microsoft.com/office/drawing/2014/main" id="{D9B1E101-4FC0-4772-A3A2-7DDB9FC90B5D}"/>
+              </a:ext>
+            </a:extLst>
+          </p:cNvPr>
+          <p:cNvCxnSpPr>
+            <a:cxnSpLocks/>
+          </p:cNvCxnSpPr>
+          <p:nvPr/>
+        </p:nvCxnSpPr>
+        <p:spPr>
+          <a:xfrm flipH="1">
+            <a:off x="5133801" y="3274602"/>
+            <a:ext cx="1578469" cy="0"/>
+          </a:xfrm>
+          <a:prstGeom prst="straightConnector1">
+            <a:avLst/>
+          </a:prstGeom>
+          <a:ln>
+            <a:solidFill>
+              <a:schemeClr val="tx1">
+                <a:lumMod val="95000"/>
+                <a:lumOff val="5000"/>
+              </a:schemeClr>
+            </a:solidFill>
+            <a:tailEnd type="triangle"/>
+          </a:ln>
+        </p:spPr>
+        <p:style>
+          <a:lnRef idx="1">
+            <a:schemeClr val="accent1"/>
+          </a:lnRef>
+          <a:fillRef idx="0">
+            <a:schemeClr val="accent1"/>
+          </a:fillRef>
+          <a:effectRef idx="0">
+            <a:schemeClr val="accent1"/>
+          </a:effectRef>
+          <a:fontRef idx="minor">
+            <a:schemeClr val="tx1"/>
+          </a:fontRef>
+        </p:style>
+      </p:cxnSp>
+      <p:cxnSp>
+        <p:nvCxnSpPr>
+          <p:cNvPr id="106" name="Connector: Elbow 105">
+            <a:extLst>
+              <a:ext uri="{FF2B5EF4-FFF2-40B4-BE49-F238E27FC236}">
+                <a16:creationId xmlns:a16="http://schemas.microsoft.com/office/drawing/2014/main" id="{E8B8D5CA-7352-4FDC-862B-75BA46D01BAA}"/>
+              </a:ext>
+            </a:extLst>
+          </p:cNvPr>
+          <p:cNvCxnSpPr>
+            <a:stCxn id="77" idx="3"/>
+            <a:endCxn id="65" idx="0"/>
+          </p:cNvCxnSpPr>
+          <p:nvPr/>
+        </p:nvCxnSpPr>
+        <p:spPr>
+          <a:xfrm>
+            <a:off x="8483909" y="2068855"/>
+            <a:ext cx="252819" cy="160922"/>
+          </a:xfrm>
+          <a:prstGeom prst="bentConnector2">
+            <a:avLst/>
+          </a:prstGeom>
+          <a:ln>
+            <a:solidFill>
+              <a:schemeClr val="tx1">
+                <a:lumMod val="95000"/>
+                <a:lumOff val="5000"/>
+              </a:schemeClr>
+            </a:solidFill>
+            <a:tailEnd type="triangle"/>
+          </a:ln>
+        </p:spPr>
+        <p:style>
+          <a:lnRef idx="1">
+            <a:schemeClr val="accent1"/>
+          </a:lnRef>
+          <a:fillRef idx="0">
+            <a:schemeClr val="accent1"/>
+          </a:fillRef>
+          <a:effectRef idx="0">
+            <a:schemeClr val="accent1"/>
+          </a:effectRef>
+          <a:fontRef idx="minor">
+            <a:schemeClr val="tx1"/>
+          </a:fontRef>
+        </p:style>
+      </p:cxnSp>
+      <p:cxnSp>
+        <p:nvCxnSpPr>
+          <p:cNvPr id="107" name="Straight Arrow Connector 106">
+            <a:extLst>
+              <a:ext uri="{FF2B5EF4-FFF2-40B4-BE49-F238E27FC236}">
+                <a16:creationId xmlns:a16="http://schemas.microsoft.com/office/drawing/2014/main" id="{32EB9520-8BA5-4E9D-BF3B-4CEBC596F1EB}"/>
+              </a:ext>
+            </a:extLst>
+          </p:cNvPr>
+          <p:cNvCxnSpPr>
+            <a:cxnSpLocks/>
+          </p:cNvCxnSpPr>
+          <p:nvPr/>
+        </p:nvCxnSpPr>
+        <p:spPr>
+          <a:xfrm flipH="1">
+            <a:off x="3575013" y="3493332"/>
+            <a:ext cx="1578469" cy="0"/>
+          </a:xfrm>
+          <a:prstGeom prst="straightConnector1">
+            <a:avLst/>
+          </a:prstGeom>
+          <a:ln>
+            <a:solidFill>
+              <a:schemeClr val="tx1">
+                <a:lumMod val="95000"/>
+                <a:lumOff val="5000"/>
+              </a:schemeClr>
+            </a:solidFill>
+            <a:tailEnd type="triangle"/>
+          </a:ln>
+        </p:spPr>
+        <p:style>
+          <a:lnRef idx="1">
+            <a:schemeClr val="accent1"/>
+          </a:lnRef>
+          <a:fillRef idx="0">
+            <a:schemeClr val="accent1"/>
+          </a:fillRef>
+          <a:effectRef idx="0">
+            <a:schemeClr val="accent1"/>
+          </a:effectRef>
+          <a:fontRef idx="minor">
+            <a:schemeClr val="tx1"/>
+          </a:fontRef>
+        </p:style>
+      </p:cxnSp>
+      <p:cxnSp>
+        <p:nvCxnSpPr>
+          <p:cNvPr id="108" name="Straight Arrow Connector 107">
+            <a:extLst>
+              <a:ext uri="{FF2B5EF4-FFF2-40B4-BE49-F238E27FC236}">
+                <a16:creationId xmlns:a16="http://schemas.microsoft.com/office/drawing/2014/main" id="{7BC9BA56-D1EB-45BE-8940-0590E5228654}"/>
+              </a:ext>
+            </a:extLst>
+          </p:cNvPr>
+          <p:cNvCxnSpPr>
+            <a:cxnSpLocks/>
+          </p:cNvCxnSpPr>
+          <p:nvPr/>
+        </p:nvCxnSpPr>
+        <p:spPr>
+          <a:xfrm flipH="1">
+            <a:off x="2167353" y="3707323"/>
+            <a:ext cx="1422729" cy="0"/>
+          </a:xfrm>
+          <a:prstGeom prst="straightConnector1">
+            <a:avLst/>
+          </a:prstGeom>
+          <a:ln>
+            <a:solidFill>
+              <a:schemeClr val="tx1">
+                <a:lumMod val="95000"/>
+                <a:lumOff val="5000"/>
+              </a:schemeClr>
+            </a:solidFill>
+            <a:tailEnd type="triangle"/>
+          </a:ln>
+        </p:spPr>
+        <p:style>
+          <a:lnRef idx="1">
+            <a:schemeClr val="accent1"/>
+          </a:lnRef>
+          <a:fillRef idx="0">
+            <a:schemeClr val="accent1"/>
+          </a:fillRef>
+          <a:effectRef idx="0">
+            <a:schemeClr val="accent1"/>
+          </a:effectRef>
+          <a:fontRef idx="minor">
+            <a:schemeClr val="tx1"/>
+          </a:fontRef>
+        </p:style>
+      </p:cxnSp>
+      <p:sp>
+        <p:nvSpPr>
+          <p:cNvPr id="110" name="Rectangle: Rounded Corners 109">
+            <a:extLst>
+              <a:ext uri="{FF2B5EF4-FFF2-40B4-BE49-F238E27FC236}">
+                <a16:creationId xmlns:a16="http://schemas.microsoft.com/office/drawing/2014/main" id="{04C4BD20-5D37-456A-A0C4-767EA78BAB5D}"/>
+              </a:ext>
+            </a:extLst>
+          </p:cNvPr>
+          <p:cNvSpPr/>
+          <p:nvPr/>
+        </p:nvSpPr>
+        <p:spPr>
+          <a:xfrm>
+            <a:off x="6467775" y="2429792"/>
+            <a:ext cx="493860" cy="172810"/>
+          </a:xfrm>
+          <a:prstGeom prst="roundRect">
+            <a:avLst/>
+          </a:prstGeom>
+          <a:solidFill>
+            <a:schemeClr val="accent6">
+              <a:lumMod val="75000"/>
+            </a:schemeClr>
+          </a:solidFill>
+        </p:spPr>
+        <p:style>
+          <a:lnRef idx="2">
+            <a:schemeClr val="accent4">
+              <a:shade val="50000"/>
+            </a:schemeClr>
+          </a:lnRef>
+          <a:fillRef idx="1">
+            <a:schemeClr val="accent4"/>
+          </a:fillRef>
+          <a:effectRef idx="0">
+            <a:schemeClr val="accent4"/>
+          </a:effectRef>
+          <a:fontRef idx="minor">
+            <a:schemeClr val="lt1"/>
+          </a:fontRef>
+        </p:style>
+        <p:txBody>
+          <a:bodyPr rtlCol="0" anchor="ctr"/>
+          <a:lstStyle/>
+          <a:p>
+            <a:pPr algn="ctr"/>
+            <a:r>
+              <a:rPr lang="en-GB" sz="400" b="1" dirty="0"/>
+              <a:t>index.html</a:t>
+            </a:r>
+          </a:p>
+        </p:txBody>
+      </p:sp>
+      <p:sp>
+        <p:nvSpPr>
+          <p:cNvPr id="111" name="Rectangle: Rounded Corners 110">
+            <a:extLst>
+              <a:ext uri="{FF2B5EF4-FFF2-40B4-BE49-F238E27FC236}">
+                <a16:creationId xmlns:a16="http://schemas.microsoft.com/office/drawing/2014/main" id="{3348A18E-3CDE-4288-9576-CA20E10739EF}"/>
+              </a:ext>
+            </a:extLst>
+          </p:cNvPr>
+          <p:cNvSpPr/>
+          <p:nvPr/>
+        </p:nvSpPr>
+        <p:spPr>
+          <a:xfrm>
+            <a:off x="6466834" y="2654199"/>
+            <a:ext cx="493860" cy="172810"/>
+          </a:xfrm>
+          <a:prstGeom prst="roundRect">
+            <a:avLst/>
+          </a:prstGeom>
+          <a:solidFill>
+            <a:schemeClr val="accent6">
+              <a:lumMod val="75000"/>
+            </a:schemeClr>
+          </a:solidFill>
+        </p:spPr>
+        <p:style>
+          <a:lnRef idx="2">
+            <a:schemeClr val="accent4">
+              <a:shade val="50000"/>
+            </a:schemeClr>
+          </a:lnRef>
+          <a:fillRef idx="1">
+            <a:schemeClr val="accent4"/>
+          </a:fillRef>
+          <a:effectRef idx="0">
+            <a:schemeClr val="accent4"/>
+          </a:effectRef>
+          <a:fontRef idx="minor">
+            <a:schemeClr val="lt1"/>
+          </a:fontRef>
+        </p:style>
+        <p:txBody>
+          <a:bodyPr rtlCol="0" anchor="ctr"/>
+          <a:lstStyle/>
+          <a:p>
+            <a:pPr algn="ctr"/>
+            <a:r>
+              <a:rPr lang="en-GB" sz="400" b="1" dirty="0"/>
+              <a:t>boardtasks.html</a:t>
+            </a:r>
+          </a:p>
+        </p:txBody>
+      </p:sp>
+      <p:sp>
+        <p:nvSpPr>
+          <p:cNvPr id="112" name="Rectangle: Rounded Corners 111">
+            <a:extLst>
+              <a:ext uri="{FF2B5EF4-FFF2-40B4-BE49-F238E27FC236}">
+                <a16:creationId xmlns:a16="http://schemas.microsoft.com/office/drawing/2014/main" id="{42247031-3ED4-4BA2-9C4A-FBDB8442175F}"/>
+              </a:ext>
+            </a:extLst>
+          </p:cNvPr>
+          <p:cNvSpPr/>
+          <p:nvPr/>
+        </p:nvSpPr>
+        <p:spPr>
+          <a:xfrm>
+            <a:off x="6470111" y="2883941"/>
+            <a:ext cx="493860" cy="172810"/>
+          </a:xfrm>
+          <a:prstGeom prst="roundRect">
+            <a:avLst/>
+          </a:prstGeom>
+          <a:solidFill>
+            <a:schemeClr val="accent6">
+              <a:lumMod val="75000"/>
+            </a:schemeClr>
+          </a:solidFill>
+        </p:spPr>
+        <p:style>
+          <a:lnRef idx="2">
+            <a:schemeClr val="accent4">
+              <a:shade val="50000"/>
+            </a:schemeClr>
+          </a:lnRef>
+          <a:fillRef idx="1">
+            <a:schemeClr val="accent4"/>
+          </a:fillRef>
+          <a:effectRef idx="0">
+            <a:schemeClr val="accent4"/>
+          </a:effectRef>
+          <a:fontRef idx="minor">
+            <a:schemeClr val="lt1"/>
+          </a:fontRef>
+        </p:style>
+        <p:txBody>
+          <a:bodyPr rtlCol="0" anchor="ctr"/>
+          <a:lstStyle/>
+          <a:p>
+            <a:pPr algn="ctr"/>
+            <a:r>
+              <a:rPr lang="en-GB" sz="400" b="1" dirty="0"/>
+              <a:t>move_confirmed.html</a:t>
+            </a:r>
+          </a:p>
+        </p:txBody>
+      </p:sp>
+      <p:sp>
+        <p:nvSpPr>
+          <p:cNvPr id="114" name="Rectangle: Rounded Corners 113">
+            <a:extLst>
+              <a:ext uri="{FF2B5EF4-FFF2-40B4-BE49-F238E27FC236}">
+                <a16:creationId xmlns:a16="http://schemas.microsoft.com/office/drawing/2014/main" id="{3568EBDC-FF8C-4DC2-9405-5B31889DDB7D}"/>
+              </a:ext>
+            </a:extLst>
+          </p:cNvPr>
+          <p:cNvSpPr/>
+          <p:nvPr/>
+        </p:nvSpPr>
+        <p:spPr>
+          <a:xfrm>
+            <a:off x="9550083" y="3053412"/>
+            <a:ext cx="493860" cy="172810"/>
+          </a:xfrm>
+          <a:prstGeom prst="roundRect">
+            <a:avLst/>
+          </a:prstGeom>
+          <a:solidFill>
+            <a:schemeClr val="accent2">
+              <a:lumMod val="75000"/>
+            </a:schemeClr>
+          </a:solidFill>
+        </p:spPr>
+        <p:style>
+          <a:lnRef idx="2">
+            <a:schemeClr val="accent4">
+              <a:shade val="50000"/>
+            </a:schemeClr>
+          </a:lnRef>
+          <a:fillRef idx="1">
+            <a:schemeClr val="accent4"/>
+          </a:fillRef>
+          <a:effectRef idx="0">
+            <a:schemeClr val="accent4"/>
+          </a:effectRef>
+          <a:fontRef idx="minor">
+            <a:schemeClr val="lt1"/>
+          </a:fontRef>
+        </p:style>
+        <p:txBody>
+          <a:bodyPr rtlCol="0" anchor="ctr"/>
+          <a:lstStyle/>
+          <a:p>
+            <a:pPr algn="ctr"/>
+            <a:r>
+              <a:rPr lang="en-GB" sz="500" b="1" dirty="0"/>
+              <a:t>POST</a:t>
+            </a:r>
+          </a:p>
+        </p:txBody>
+      </p:sp>
+      <p:sp>
+        <p:nvSpPr>
+          <p:cNvPr id="115" name="Rectangle: Rounded Corners 114">
+            <a:extLst>
+              <a:ext uri="{FF2B5EF4-FFF2-40B4-BE49-F238E27FC236}">
+                <a16:creationId xmlns:a16="http://schemas.microsoft.com/office/drawing/2014/main" id="{9276A952-3AA5-47E8-9D3C-002F0A9CA610}"/>
+              </a:ext>
+            </a:extLst>
+          </p:cNvPr>
+          <p:cNvSpPr/>
+          <p:nvPr/>
+        </p:nvSpPr>
+        <p:spPr>
+          <a:xfrm>
+            <a:off x="9550083" y="3288860"/>
+            <a:ext cx="493860" cy="172810"/>
+          </a:xfrm>
+          <a:prstGeom prst="roundRect">
+            <a:avLst/>
+          </a:prstGeom>
+          <a:solidFill>
+            <a:schemeClr val="accent2">
+              <a:lumMod val="75000"/>
+            </a:schemeClr>
+          </a:solidFill>
+        </p:spPr>
+        <p:style>
+          <a:lnRef idx="2">
+            <a:schemeClr val="accent4">
+              <a:shade val="50000"/>
+            </a:schemeClr>
+          </a:lnRef>
+          <a:fillRef idx="1">
+            <a:schemeClr val="accent4"/>
+          </a:fillRef>
+          <a:effectRef idx="0">
+            <a:schemeClr val="accent4"/>
+          </a:effectRef>
+          <a:fontRef idx="minor">
+            <a:schemeClr val="lt1"/>
+          </a:fontRef>
+        </p:style>
+        <p:txBody>
+          <a:bodyPr rtlCol="0" anchor="ctr"/>
+          <a:lstStyle/>
+          <a:p>
+            <a:pPr algn="ctr"/>
+            <a:r>
+              <a:rPr lang="en-GB" sz="500" b="1" dirty="0"/>
+              <a:t>PUT</a:t>
+            </a:r>
+          </a:p>
+        </p:txBody>
+      </p:sp>
+      <p:sp>
+        <p:nvSpPr>
+          <p:cNvPr id="116" name="Rectangle: Rounded Corners 115">
+            <a:extLst>
+              <a:ext uri="{FF2B5EF4-FFF2-40B4-BE49-F238E27FC236}">
+                <a16:creationId xmlns:a16="http://schemas.microsoft.com/office/drawing/2014/main" id="{C6CBFD5B-718A-4C43-952D-12121BB3E560}"/>
+              </a:ext>
+            </a:extLst>
+          </p:cNvPr>
+          <p:cNvSpPr/>
+          <p:nvPr/>
+        </p:nvSpPr>
+        <p:spPr>
+          <a:xfrm>
+            <a:off x="9557754" y="3525618"/>
+            <a:ext cx="493860" cy="172810"/>
+          </a:xfrm>
+          <a:prstGeom prst="roundRect">
+            <a:avLst/>
+          </a:prstGeom>
+          <a:solidFill>
+            <a:schemeClr val="accent2">
+              <a:lumMod val="75000"/>
+            </a:schemeClr>
+          </a:solidFill>
+        </p:spPr>
+        <p:style>
+          <a:lnRef idx="2">
+            <a:schemeClr val="accent4">
+              <a:shade val="50000"/>
+            </a:schemeClr>
+          </a:lnRef>
+          <a:fillRef idx="1">
+            <a:schemeClr val="accent4"/>
+          </a:fillRef>
+          <a:effectRef idx="0">
+            <a:schemeClr val="accent4"/>
+          </a:effectRef>
+          <a:fontRef idx="minor">
+            <a:schemeClr val="lt1"/>
+          </a:fontRef>
+        </p:style>
+        <p:txBody>
+          <a:bodyPr rtlCol="0" anchor="ctr"/>
+          <a:lstStyle/>
+          <a:p>
+            <a:pPr algn="ctr"/>
+            <a:r>
+              <a:rPr lang="en-GB" sz="500" b="1" dirty="0"/>
+              <a:t>DELETE</a:t>
+            </a:r>
+          </a:p>
+        </p:txBody>
+      </p:sp>
+      <p:sp>
+        <p:nvSpPr>
+          <p:cNvPr id="118" name="Rectangle: Rounded Corners 117">
+            <a:extLst>
+              <a:ext uri="{FF2B5EF4-FFF2-40B4-BE49-F238E27FC236}">
+                <a16:creationId xmlns:a16="http://schemas.microsoft.com/office/drawing/2014/main" id="{86BDFAE5-7E92-451B-8E62-BEEF11B6A1DA}"/>
+              </a:ext>
+            </a:extLst>
+          </p:cNvPr>
+          <p:cNvSpPr/>
+          <p:nvPr/>
+        </p:nvSpPr>
+        <p:spPr>
+          <a:xfrm>
+            <a:off x="3343151" y="2371927"/>
+            <a:ext cx="493860" cy="172810"/>
+          </a:xfrm>
+          <a:prstGeom prst="roundRect">
+            <a:avLst/>
+          </a:prstGeom>
+          <a:solidFill>
+            <a:schemeClr val="accent5">
+              <a:lumMod val="75000"/>
+            </a:schemeClr>
+          </a:solidFill>
+        </p:spPr>
+        <p:style>
+          <a:lnRef idx="2">
+            <a:schemeClr val="accent4">
+              <a:shade val="50000"/>
+            </a:schemeClr>
+          </a:lnRef>
+          <a:fillRef idx="1">
+            <a:schemeClr val="accent4"/>
+          </a:fillRef>
+          <a:effectRef idx="0">
+            <a:schemeClr val="accent4"/>
+          </a:effectRef>
+          <a:fontRef idx="minor">
+            <a:schemeClr val="lt1"/>
+          </a:fontRef>
+        </p:style>
+        <p:txBody>
+          <a:bodyPr rtlCol="0" anchor="ctr"/>
+          <a:lstStyle/>
+          <a:p>
+            <a:pPr algn="ctr"/>
+            <a:r>
+              <a:rPr lang="en-GB" sz="400" b="1" dirty="0"/>
+              <a:t>localhost</a:t>
+            </a:r>
+          </a:p>
+        </p:txBody>
+      </p:sp>
+      <p:sp>
+        <p:nvSpPr>
+          <p:cNvPr id="119" name="Rectangle: Rounded Corners 118">
+            <a:extLst>
+              <a:ext uri="{FF2B5EF4-FFF2-40B4-BE49-F238E27FC236}">
+                <a16:creationId xmlns:a16="http://schemas.microsoft.com/office/drawing/2014/main" id="{FFC9B6B9-7E8F-4F1F-B6B1-0044CC6BAA9F}"/>
+              </a:ext>
+            </a:extLst>
+          </p:cNvPr>
+          <p:cNvSpPr/>
+          <p:nvPr/>
+        </p:nvSpPr>
+        <p:spPr>
+          <a:xfrm>
+            <a:off x="3346892" y="2580769"/>
+            <a:ext cx="493860" cy="172810"/>
+          </a:xfrm>
+          <a:prstGeom prst="roundRect">
+            <a:avLst/>
+          </a:prstGeom>
+          <a:solidFill>
+            <a:schemeClr val="accent5">
+              <a:lumMod val="75000"/>
+            </a:schemeClr>
+          </a:solidFill>
+        </p:spPr>
+        <p:style>
+          <a:lnRef idx="2">
+            <a:schemeClr val="accent4">
+              <a:shade val="50000"/>
+            </a:schemeClr>
+          </a:lnRef>
+          <a:fillRef idx="1">
+            <a:schemeClr val="accent4"/>
+          </a:fillRef>
+          <a:effectRef idx="0">
+            <a:schemeClr val="accent4"/>
+          </a:effectRef>
+          <a:fontRef idx="minor">
+            <a:schemeClr val="lt1"/>
+          </a:fontRef>
+        </p:style>
+        <p:txBody>
+          <a:bodyPr rtlCol="0" anchor="ctr"/>
+          <a:lstStyle/>
+          <a:p>
+            <a:pPr algn="ctr"/>
+            <a:r>
+              <a:rPr lang="en-GB" sz="400" b="1" dirty="0"/>
+              <a:t>TCP 5000</a:t>
+            </a:r>
+          </a:p>
+        </p:txBody>
+      </p:sp>
+      <p:sp>
+        <p:nvSpPr>
+          <p:cNvPr id="120" name="Rectangle: Rounded Corners 119">
+            <a:extLst>
+              <a:ext uri="{FF2B5EF4-FFF2-40B4-BE49-F238E27FC236}">
+                <a16:creationId xmlns:a16="http://schemas.microsoft.com/office/drawing/2014/main" id="{D623AADC-25A2-4CB8-8DDF-73F5846D15AA}"/>
+              </a:ext>
+            </a:extLst>
+          </p:cNvPr>
+          <p:cNvSpPr/>
+          <p:nvPr/>
+        </p:nvSpPr>
+        <p:spPr>
+          <a:xfrm>
+            <a:off x="3912738" y="1707939"/>
+            <a:ext cx="914399" cy="172810"/>
+          </a:xfrm>
+          <a:prstGeom prst="roundRect">
+            <a:avLst/>
+          </a:prstGeom>
+          <a:solidFill>
+            <a:schemeClr val="tx2"/>
+          </a:solidFill>
+        </p:spPr>
+        <p:style>
+          <a:lnRef idx="2">
+            <a:schemeClr val="accent4">
+              <a:shade val="50000"/>
+            </a:schemeClr>
+          </a:lnRef>
+          <a:fillRef idx="1">
+            <a:schemeClr val="accent4"/>
+          </a:fillRef>
+          <a:effectRef idx="0">
+            <a:schemeClr val="accent4"/>
+          </a:effectRef>
+          <a:fontRef idx="minor">
+            <a:schemeClr val="lt1"/>
+          </a:fontRef>
+        </p:style>
+        <p:txBody>
+          <a:bodyPr rtlCol="0" anchor="ctr"/>
+          <a:lstStyle/>
+          <a:p>
+            <a:pPr algn="ctr"/>
+            <a:r>
+              <a:rPr lang="en-GB" sz="500" b="1" dirty="0"/>
+              <a:t>Poetry</a:t>
+            </a:r>
+          </a:p>
+        </p:txBody>
+      </p:sp>
+      <p:sp>
+        <p:nvSpPr>
+          <p:cNvPr id="24" name="TextBox 23">
+            <a:extLst>
+              <a:ext uri="{FF2B5EF4-FFF2-40B4-BE49-F238E27FC236}">
+                <a16:creationId xmlns:a16="http://schemas.microsoft.com/office/drawing/2014/main" id="{AE718D6F-8302-4798-9BFB-029CAA15E687}"/>
               </a:ext>
             </a:extLst>
           </p:cNvPr>
@@ -8227,8 +9415,8 @@
         </p:nvSpPr>
         <p:spPr>
           <a:xfrm>
-            <a:off x="7719319" y="4323118"/>
-            <a:ext cx="1333506" cy="369332"/>
+            <a:off x="2773132" y="2376888"/>
+            <a:ext cx="713225" cy="369332"/>
           </a:xfrm>
           <a:prstGeom prst="rect">
             <a:avLst/>
@@ -8241,14 +9429,803 @@
           </a:bodyPr>
           <a:lstStyle/>
           <a:p>
-            <a:pPr algn="ctr"/>
-            <a:r>
-              <a:rPr lang="en-GB" sz="900" dirty="0">
+            <a:r>
+              <a:rPr lang="en-GB" sz="600" dirty="0">
                 <a:solidFill>
-                  <a:schemeClr val="accent1"/>
+                  <a:schemeClr val="bg1"/>
                 </a:solidFill>
               </a:rPr>
-              <a:t>Data read and writes from store</a:t>
+              <a:t>Local machine listening ports for web server</a:t>
+            </a:r>
+          </a:p>
+        </p:txBody>
+      </p:sp>
+      <p:sp>
+        <p:nvSpPr>
+          <p:cNvPr id="76" name="TextBox 75">
+            <a:extLst>
+              <a:ext uri="{FF2B5EF4-FFF2-40B4-BE49-F238E27FC236}">
+                <a16:creationId xmlns:a16="http://schemas.microsoft.com/office/drawing/2014/main" id="{6687C74E-6588-4EE7-AA76-8E6229B46200}"/>
+              </a:ext>
+            </a:extLst>
+          </p:cNvPr>
+          <p:cNvSpPr txBox="1"/>
+          <p:nvPr/>
+        </p:nvSpPr>
+        <p:spPr>
+          <a:xfrm>
+            <a:off x="2409512" y="2010909"/>
+            <a:ext cx="1100817" cy="184666"/>
+          </a:xfrm>
+          <a:prstGeom prst="rect">
+            <a:avLst/>
+          </a:prstGeom>
+          <a:noFill/>
+        </p:spPr>
+        <p:txBody>
+          <a:bodyPr wrap="square" rtlCol="0">
+            <a:spAutoFit/>
+          </a:bodyPr>
+          <a:lstStyle/>
+          <a:p>
+            <a:r>
+              <a:rPr lang="en-GB" sz="600" dirty="0"/>
+              <a:t>User browses to WSGI</a:t>
+            </a:r>
+          </a:p>
+        </p:txBody>
+      </p:sp>
+      <p:sp>
+        <p:nvSpPr>
+          <p:cNvPr id="80" name="TextBox 79">
+            <a:extLst>
+              <a:ext uri="{FF2B5EF4-FFF2-40B4-BE49-F238E27FC236}">
+                <a16:creationId xmlns:a16="http://schemas.microsoft.com/office/drawing/2014/main" id="{A8181522-06A6-4AB3-BB8D-6678E69E004B}"/>
+              </a:ext>
+            </a:extLst>
+          </p:cNvPr>
+          <p:cNvSpPr txBox="1"/>
+          <p:nvPr/>
+        </p:nvSpPr>
+        <p:spPr>
+          <a:xfrm>
+            <a:off x="5621030" y="2599999"/>
+            <a:ext cx="835759" cy="276999"/>
+          </a:xfrm>
+          <a:prstGeom prst="rect">
+            <a:avLst/>
+          </a:prstGeom>
+          <a:noFill/>
+        </p:spPr>
+        <p:txBody>
+          <a:bodyPr wrap="square" rtlCol="0">
+            <a:spAutoFit/>
+          </a:bodyPr>
+          <a:lstStyle/>
+          <a:p>
+            <a:r>
+              <a:rPr lang="en-GB" sz="600" dirty="0">
+                <a:solidFill>
+                  <a:schemeClr val="bg1"/>
+                </a:solidFill>
+              </a:rPr>
+              <a:t>Show all task for board page</a:t>
+            </a:r>
+          </a:p>
+        </p:txBody>
+      </p:sp>
+      <p:sp>
+        <p:nvSpPr>
+          <p:cNvPr id="81" name="TextBox 80">
+            <a:extLst>
+              <a:ext uri="{FF2B5EF4-FFF2-40B4-BE49-F238E27FC236}">
+                <a16:creationId xmlns:a16="http://schemas.microsoft.com/office/drawing/2014/main" id="{DB90119D-BE7C-4ACE-B77C-F06C74B15177}"/>
+              </a:ext>
+            </a:extLst>
+          </p:cNvPr>
+          <p:cNvSpPr txBox="1"/>
+          <p:nvPr/>
+        </p:nvSpPr>
+        <p:spPr>
+          <a:xfrm>
+            <a:off x="5625909" y="2845532"/>
+            <a:ext cx="835759" cy="276999"/>
+          </a:xfrm>
+          <a:prstGeom prst="rect">
+            <a:avLst/>
+          </a:prstGeom>
+          <a:noFill/>
+        </p:spPr>
+        <p:txBody>
+          <a:bodyPr wrap="square" rtlCol="0">
+            <a:spAutoFit/>
+          </a:bodyPr>
+          <a:lstStyle/>
+          <a:p>
+            <a:r>
+              <a:rPr lang="en-GB" sz="600" dirty="0">
+                <a:solidFill>
+                  <a:schemeClr val="bg1"/>
+                </a:solidFill>
+              </a:rPr>
+              <a:t>Confirmation of task update page</a:t>
+            </a:r>
+          </a:p>
+        </p:txBody>
+      </p:sp>
+      <p:sp>
+        <p:nvSpPr>
+          <p:cNvPr id="83" name="TextBox 82">
+            <a:extLst>
+              <a:ext uri="{FF2B5EF4-FFF2-40B4-BE49-F238E27FC236}">
+                <a16:creationId xmlns:a16="http://schemas.microsoft.com/office/drawing/2014/main" id="{383D6920-4097-4161-93C3-7259823D0012}"/>
+              </a:ext>
+            </a:extLst>
+          </p:cNvPr>
+          <p:cNvSpPr txBox="1"/>
+          <p:nvPr/>
+        </p:nvSpPr>
+        <p:spPr>
+          <a:xfrm>
+            <a:off x="5628784" y="2422089"/>
+            <a:ext cx="1100817" cy="184666"/>
+          </a:xfrm>
+          <a:prstGeom prst="rect">
+            <a:avLst/>
+          </a:prstGeom>
+          <a:noFill/>
+        </p:spPr>
+        <p:txBody>
+          <a:bodyPr wrap="square" rtlCol="0">
+            <a:spAutoFit/>
+          </a:bodyPr>
+          <a:lstStyle/>
+          <a:p>
+            <a:r>
+              <a:rPr lang="en-GB" sz="600" dirty="0">
+                <a:solidFill>
+                  <a:schemeClr val="bg1"/>
+                </a:solidFill>
+              </a:rPr>
+              <a:t>Website landing page</a:t>
+            </a:r>
+          </a:p>
+        </p:txBody>
+      </p:sp>
+      <p:sp>
+        <p:nvSpPr>
+          <p:cNvPr id="84" name="TextBox 83">
+            <a:extLst>
+              <a:ext uri="{FF2B5EF4-FFF2-40B4-BE49-F238E27FC236}">
+                <a16:creationId xmlns:a16="http://schemas.microsoft.com/office/drawing/2014/main" id="{2ED13E39-78D3-43AF-96CE-0100B165CCC8}"/>
+              </a:ext>
+            </a:extLst>
+          </p:cNvPr>
+          <p:cNvSpPr txBox="1"/>
+          <p:nvPr/>
+        </p:nvSpPr>
+        <p:spPr>
+          <a:xfrm>
+            <a:off x="3885447" y="2086481"/>
+            <a:ext cx="1100817" cy="184666"/>
+          </a:xfrm>
+          <a:prstGeom prst="rect">
+            <a:avLst/>
+          </a:prstGeom>
+          <a:noFill/>
+        </p:spPr>
+        <p:txBody>
+          <a:bodyPr wrap="square" rtlCol="0">
+            <a:spAutoFit/>
+          </a:bodyPr>
+          <a:lstStyle/>
+          <a:p>
+            <a:r>
+              <a:rPr lang="en-GB" sz="600" dirty="0"/>
+              <a:t>WSGI passes request to Flask</a:t>
+            </a:r>
+          </a:p>
+        </p:txBody>
+      </p:sp>
+      <p:sp>
+        <p:nvSpPr>
+          <p:cNvPr id="85" name="TextBox 84">
+            <a:extLst>
+              <a:ext uri="{FF2B5EF4-FFF2-40B4-BE49-F238E27FC236}">
+                <a16:creationId xmlns:a16="http://schemas.microsoft.com/office/drawing/2014/main" id="{915BE927-AB85-4523-8502-D64508A26BAE}"/>
+              </a:ext>
+            </a:extLst>
+          </p:cNvPr>
+          <p:cNvSpPr txBox="1"/>
+          <p:nvPr/>
+        </p:nvSpPr>
+        <p:spPr>
+          <a:xfrm>
+            <a:off x="5728835" y="2179529"/>
+            <a:ext cx="1256647" cy="184666"/>
+          </a:xfrm>
+          <a:prstGeom prst="rect">
+            <a:avLst/>
+          </a:prstGeom>
+          <a:noFill/>
+        </p:spPr>
+        <p:txBody>
+          <a:bodyPr wrap="square" rtlCol="0">
+            <a:spAutoFit/>
+          </a:bodyPr>
+          <a:lstStyle/>
+          <a:p>
+            <a:r>
+              <a:rPr lang="en-GB" sz="600" dirty="0"/>
+              <a:t>Route of web </a:t>
+            </a:r>
+            <a:r>
+              <a:rPr lang="en-GB" sz="600" dirty="0" err="1"/>
+              <a:t>url</a:t>
+            </a:r>
+            <a:r>
+              <a:rPr lang="en-GB" sz="600" dirty="0"/>
+              <a:t> passed to code</a:t>
+            </a:r>
+          </a:p>
+        </p:txBody>
+      </p:sp>
+      <p:sp>
+        <p:nvSpPr>
+          <p:cNvPr id="86" name="TextBox 85">
+            <a:extLst>
+              <a:ext uri="{FF2B5EF4-FFF2-40B4-BE49-F238E27FC236}">
+                <a16:creationId xmlns:a16="http://schemas.microsoft.com/office/drawing/2014/main" id="{D3C0BFAA-1B04-4344-B495-6ED5FF8D7625}"/>
+              </a:ext>
+            </a:extLst>
+          </p:cNvPr>
+          <p:cNvSpPr txBox="1"/>
+          <p:nvPr/>
+        </p:nvSpPr>
+        <p:spPr>
+          <a:xfrm>
+            <a:off x="7607617" y="2368978"/>
+            <a:ext cx="1256647" cy="184666"/>
+          </a:xfrm>
+          <a:prstGeom prst="rect">
+            <a:avLst/>
+          </a:prstGeom>
+          <a:noFill/>
+        </p:spPr>
+        <p:txBody>
+          <a:bodyPr wrap="square" rtlCol="0">
+            <a:spAutoFit/>
+          </a:bodyPr>
+          <a:lstStyle/>
+          <a:p>
+            <a:r>
+              <a:rPr lang="en-GB" sz="600" dirty="0"/>
+              <a:t>Code executed based on route</a:t>
+            </a:r>
+          </a:p>
+        </p:txBody>
+      </p:sp>
+      <p:sp>
+        <p:nvSpPr>
+          <p:cNvPr id="89" name="TextBox 88">
+            <a:extLst>
+              <a:ext uri="{FF2B5EF4-FFF2-40B4-BE49-F238E27FC236}">
+                <a16:creationId xmlns:a16="http://schemas.microsoft.com/office/drawing/2014/main" id="{74172311-C4F7-41D8-9746-C9AF7447A925}"/>
+              </a:ext>
+            </a:extLst>
+          </p:cNvPr>
+          <p:cNvSpPr txBox="1"/>
+          <p:nvPr/>
+        </p:nvSpPr>
+        <p:spPr>
+          <a:xfrm>
+            <a:off x="8636060" y="2456765"/>
+            <a:ext cx="1256647" cy="184666"/>
+          </a:xfrm>
+          <a:prstGeom prst="rect">
+            <a:avLst/>
+          </a:prstGeom>
+          <a:noFill/>
+        </p:spPr>
+        <p:txBody>
+          <a:bodyPr wrap="square" rtlCol="0">
+            <a:spAutoFit/>
+          </a:bodyPr>
+          <a:lstStyle/>
+          <a:p>
+            <a:r>
+              <a:rPr lang="en-GB" sz="600" dirty="0"/>
+              <a:t>API call created based on code</a:t>
+            </a:r>
+          </a:p>
+        </p:txBody>
+      </p:sp>
+      <p:sp>
+        <p:nvSpPr>
+          <p:cNvPr id="91" name="TextBox 90">
+            <a:extLst>
+              <a:ext uri="{FF2B5EF4-FFF2-40B4-BE49-F238E27FC236}">
+                <a16:creationId xmlns:a16="http://schemas.microsoft.com/office/drawing/2014/main" id="{6BE3DD94-3E21-42DD-9E10-B87B2AF7A91A}"/>
+              </a:ext>
+            </a:extLst>
+          </p:cNvPr>
+          <p:cNvSpPr txBox="1"/>
+          <p:nvPr/>
+        </p:nvSpPr>
+        <p:spPr>
+          <a:xfrm>
+            <a:off x="8438275" y="1931699"/>
+            <a:ext cx="1256647" cy="276999"/>
+          </a:xfrm>
+          <a:prstGeom prst="rect">
+            <a:avLst/>
+          </a:prstGeom>
+          <a:noFill/>
+        </p:spPr>
+        <p:txBody>
+          <a:bodyPr wrap="square" rtlCol="0">
+            <a:spAutoFit/>
+          </a:bodyPr>
+          <a:lstStyle/>
+          <a:p>
+            <a:r>
+              <a:rPr lang="en-GB" sz="600" dirty="0"/>
+              <a:t>Credentials for Trello used in API call creation</a:t>
+            </a:r>
+          </a:p>
+        </p:txBody>
+      </p:sp>
+      <p:sp>
+        <p:nvSpPr>
+          <p:cNvPr id="93" name="TextBox 92">
+            <a:extLst>
+              <a:ext uri="{FF2B5EF4-FFF2-40B4-BE49-F238E27FC236}">
+                <a16:creationId xmlns:a16="http://schemas.microsoft.com/office/drawing/2014/main" id="{51FB8409-DCB1-4493-B325-1AE62E70178D}"/>
+              </a:ext>
+            </a:extLst>
+          </p:cNvPr>
+          <p:cNvSpPr txBox="1"/>
+          <p:nvPr/>
+        </p:nvSpPr>
+        <p:spPr>
+          <a:xfrm>
+            <a:off x="8744795" y="2602827"/>
+            <a:ext cx="1256647" cy="184666"/>
+          </a:xfrm>
+          <a:prstGeom prst="rect">
+            <a:avLst/>
+          </a:prstGeom>
+          <a:noFill/>
+        </p:spPr>
+        <p:txBody>
+          <a:bodyPr wrap="square" rtlCol="0">
+            <a:spAutoFit/>
+          </a:bodyPr>
+          <a:lstStyle/>
+          <a:p>
+            <a:r>
+              <a:rPr lang="en-GB" sz="600" dirty="0"/>
+              <a:t>On success, data returned in json</a:t>
+            </a:r>
+          </a:p>
+        </p:txBody>
+      </p:sp>
+      <p:sp>
+        <p:nvSpPr>
+          <p:cNvPr id="95" name="TextBox 94">
+            <a:extLst>
+              <a:ext uri="{FF2B5EF4-FFF2-40B4-BE49-F238E27FC236}">
+                <a16:creationId xmlns:a16="http://schemas.microsoft.com/office/drawing/2014/main" id="{421CC8D2-9A34-42EF-BF71-B2B68BA2AD09}"/>
+              </a:ext>
+            </a:extLst>
+          </p:cNvPr>
+          <p:cNvSpPr txBox="1"/>
+          <p:nvPr/>
+        </p:nvSpPr>
+        <p:spPr>
+          <a:xfrm>
+            <a:off x="8188454" y="2855302"/>
+            <a:ext cx="543972" cy="461665"/>
+          </a:xfrm>
+          <a:prstGeom prst="rect">
+            <a:avLst/>
+          </a:prstGeom>
+          <a:noFill/>
+        </p:spPr>
+        <p:txBody>
+          <a:bodyPr wrap="square" rtlCol="0">
+            <a:spAutoFit/>
+          </a:bodyPr>
+          <a:lstStyle/>
+          <a:p>
+            <a:pPr algn="ctr"/>
+            <a:r>
+              <a:rPr lang="en-GB" sz="600" dirty="0"/>
+              <a:t>Response loaded into python variable</a:t>
+            </a:r>
+          </a:p>
+        </p:txBody>
+      </p:sp>
+      <p:sp>
+        <p:nvSpPr>
+          <p:cNvPr id="96" name="TextBox 95">
+            <a:extLst>
+              <a:ext uri="{FF2B5EF4-FFF2-40B4-BE49-F238E27FC236}">
+                <a16:creationId xmlns:a16="http://schemas.microsoft.com/office/drawing/2014/main" id="{160C6D42-83A9-4A69-AB3D-BCB618B0EC71}"/>
+              </a:ext>
+            </a:extLst>
+          </p:cNvPr>
+          <p:cNvSpPr txBox="1"/>
+          <p:nvPr/>
+        </p:nvSpPr>
+        <p:spPr>
+          <a:xfrm>
+            <a:off x="7738053" y="2975142"/>
+            <a:ext cx="543972" cy="461665"/>
+          </a:xfrm>
+          <a:prstGeom prst="rect">
+            <a:avLst/>
+          </a:prstGeom>
+          <a:noFill/>
+        </p:spPr>
+        <p:txBody>
+          <a:bodyPr wrap="square" rtlCol="0">
+            <a:spAutoFit/>
+          </a:bodyPr>
+          <a:lstStyle/>
+          <a:p>
+            <a:pPr algn="ctr"/>
+            <a:r>
+              <a:rPr lang="en-GB" sz="600" dirty="0"/>
+              <a:t>Data passed to Flask for rendering </a:t>
+            </a:r>
+          </a:p>
+        </p:txBody>
+      </p:sp>
+      <p:sp>
+        <p:nvSpPr>
+          <p:cNvPr id="98" name="TextBox 97">
+            <a:extLst>
+              <a:ext uri="{FF2B5EF4-FFF2-40B4-BE49-F238E27FC236}">
+                <a16:creationId xmlns:a16="http://schemas.microsoft.com/office/drawing/2014/main" id="{19AFED82-C5CD-45E4-B608-441CD52F708A}"/>
+              </a:ext>
+            </a:extLst>
+          </p:cNvPr>
+          <p:cNvSpPr txBox="1"/>
+          <p:nvPr/>
+        </p:nvSpPr>
+        <p:spPr>
+          <a:xfrm>
+            <a:off x="6805671" y="3104526"/>
+            <a:ext cx="961077" cy="276999"/>
+          </a:xfrm>
+          <a:prstGeom prst="rect">
+            <a:avLst/>
+          </a:prstGeom>
+          <a:noFill/>
+        </p:spPr>
+        <p:txBody>
+          <a:bodyPr wrap="square" rtlCol="0">
+            <a:spAutoFit/>
+          </a:bodyPr>
+          <a:lstStyle/>
+          <a:p>
+            <a:pPr algn="ctr"/>
+            <a:r>
+              <a:rPr lang="en-GB" sz="600" dirty="0"/>
+              <a:t>Data rendered into template based on code</a:t>
+            </a:r>
+          </a:p>
+        </p:txBody>
+      </p:sp>
+      <p:sp>
+        <p:nvSpPr>
+          <p:cNvPr id="101" name="TextBox 100">
+            <a:extLst>
+              <a:ext uri="{FF2B5EF4-FFF2-40B4-BE49-F238E27FC236}">
+                <a16:creationId xmlns:a16="http://schemas.microsoft.com/office/drawing/2014/main" id="{33C1821F-9A0B-411B-9D07-01CFC44678B2}"/>
+              </a:ext>
+            </a:extLst>
+          </p:cNvPr>
+          <p:cNvSpPr txBox="1"/>
+          <p:nvPr/>
+        </p:nvSpPr>
+        <p:spPr>
+          <a:xfrm>
+            <a:off x="5350685" y="3274602"/>
+            <a:ext cx="1208783" cy="276999"/>
+          </a:xfrm>
+          <a:prstGeom prst="rect">
+            <a:avLst/>
+          </a:prstGeom>
+          <a:noFill/>
+        </p:spPr>
+        <p:txBody>
+          <a:bodyPr wrap="square" rtlCol="0">
+            <a:spAutoFit/>
+          </a:bodyPr>
+          <a:lstStyle/>
+          <a:p>
+            <a:pPr algn="ctr"/>
+            <a:r>
+              <a:rPr lang="en-GB" sz="600" dirty="0"/>
+              <a:t>Flask renders data in html template for response</a:t>
+            </a:r>
+          </a:p>
+        </p:txBody>
+      </p:sp>
+      <p:sp>
+        <p:nvSpPr>
+          <p:cNvPr id="103" name="TextBox 102">
+            <a:extLst>
+              <a:ext uri="{FF2B5EF4-FFF2-40B4-BE49-F238E27FC236}">
+                <a16:creationId xmlns:a16="http://schemas.microsoft.com/office/drawing/2014/main" id="{458C4A95-2138-4E54-964A-CFA6B782AE8D}"/>
+              </a:ext>
+            </a:extLst>
+          </p:cNvPr>
+          <p:cNvSpPr txBox="1"/>
+          <p:nvPr/>
+        </p:nvSpPr>
+        <p:spPr>
+          <a:xfrm>
+            <a:off x="3747537" y="3486413"/>
+            <a:ext cx="1208783" cy="276999"/>
+          </a:xfrm>
+          <a:prstGeom prst="rect">
+            <a:avLst/>
+          </a:prstGeom>
+          <a:noFill/>
+        </p:spPr>
+        <p:txBody>
+          <a:bodyPr wrap="square" rtlCol="0">
+            <a:spAutoFit/>
+          </a:bodyPr>
+          <a:lstStyle/>
+          <a:p>
+            <a:pPr algn="ctr"/>
+            <a:r>
+              <a:rPr lang="en-GB" sz="600" dirty="0"/>
+              <a:t>Response passed to </a:t>
+            </a:r>
+            <a:r>
+              <a:rPr lang="en-GB" sz="600" dirty="0" err="1"/>
+              <a:t>gUnicorn</a:t>
+            </a:r>
+            <a:r>
+              <a:rPr lang="en-GB" sz="600" dirty="0"/>
+              <a:t> web server</a:t>
+            </a:r>
+          </a:p>
+        </p:txBody>
+      </p:sp>
+      <p:sp>
+        <p:nvSpPr>
+          <p:cNvPr id="104" name="TextBox 103">
+            <a:extLst>
+              <a:ext uri="{FF2B5EF4-FFF2-40B4-BE49-F238E27FC236}">
+                <a16:creationId xmlns:a16="http://schemas.microsoft.com/office/drawing/2014/main" id="{F5E51627-7DDE-4C22-BDD0-78AA8CF25ACF}"/>
+              </a:ext>
+            </a:extLst>
+          </p:cNvPr>
+          <p:cNvSpPr txBox="1"/>
+          <p:nvPr/>
+        </p:nvSpPr>
+        <p:spPr>
+          <a:xfrm>
+            <a:off x="2340235" y="3679259"/>
+            <a:ext cx="1208783" cy="184666"/>
+          </a:xfrm>
+          <a:prstGeom prst="rect">
+            <a:avLst/>
+          </a:prstGeom>
+          <a:noFill/>
+        </p:spPr>
+        <p:txBody>
+          <a:bodyPr wrap="square" rtlCol="0">
+            <a:spAutoFit/>
+          </a:bodyPr>
+          <a:lstStyle/>
+          <a:p>
+            <a:pPr algn="ctr"/>
+            <a:r>
+              <a:rPr lang="en-GB" sz="600" dirty="0"/>
+              <a:t>HTML rendered in user browser</a:t>
+            </a:r>
+          </a:p>
+        </p:txBody>
+      </p:sp>
+      <p:sp>
+        <p:nvSpPr>
+          <p:cNvPr id="105" name="TextBox 104">
+            <a:extLst>
+              <a:ext uri="{FF2B5EF4-FFF2-40B4-BE49-F238E27FC236}">
+                <a16:creationId xmlns:a16="http://schemas.microsoft.com/office/drawing/2014/main" id="{B203B25C-77EB-43C9-80CE-75118893D0C0}"/>
+              </a:ext>
+            </a:extLst>
+          </p:cNvPr>
+          <p:cNvSpPr txBox="1"/>
+          <p:nvPr/>
+        </p:nvSpPr>
+        <p:spPr>
+          <a:xfrm>
+            <a:off x="9096670" y="2997603"/>
+            <a:ext cx="532314" cy="553998"/>
+          </a:xfrm>
+          <a:prstGeom prst="rect">
+            <a:avLst/>
+          </a:prstGeom>
+          <a:noFill/>
+        </p:spPr>
+        <p:txBody>
+          <a:bodyPr wrap="square" rtlCol="0">
+            <a:spAutoFit/>
+          </a:bodyPr>
+          <a:lstStyle/>
+          <a:p>
+            <a:r>
+              <a:rPr lang="en-GB" sz="600" dirty="0">
+                <a:solidFill>
+                  <a:schemeClr val="bg1"/>
+                </a:solidFill>
+              </a:rPr>
+              <a:t>API call selected based on code using requests</a:t>
+            </a:r>
+          </a:p>
+        </p:txBody>
+      </p:sp>
+      <p:sp>
+        <p:nvSpPr>
+          <p:cNvPr id="109" name="TextBox 108">
+            <a:extLst>
+              <a:ext uri="{FF2B5EF4-FFF2-40B4-BE49-F238E27FC236}">
+                <a16:creationId xmlns:a16="http://schemas.microsoft.com/office/drawing/2014/main" id="{EF2769EF-A9BB-4F0B-A9B5-6EB8E1DAE25D}"/>
+              </a:ext>
+            </a:extLst>
+          </p:cNvPr>
+          <p:cNvSpPr txBox="1"/>
+          <p:nvPr/>
+        </p:nvSpPr>
+        <p:spPr>
+          <a:xfrm>
+            <a:off x="7805204" y="2131596"/>
+            <a:ext cx="1009999" cy="215444"/>
+          </a:xfrm>
+          <a:prstGeom prst="rect">
+            <a:avLst/>
+          </a:prstGeom>
+          <a:noFill/>
+        </p:spPr>
+        <p:txBody>
+          <a:bodyPr wrap="square" rtlCol="0">
+            <a:spAutoFit/>
+          </a:bodyPr>
+          <a:lstStyle/>
+          <a:p>
+            <a:r>
+              <a:rPr lang="en-GB" sz="800" b="1" dirty="0">
+                <a:solidFill>
+                  <a:schemeClr val="bg1"/>
+                </a:solidFill>
+              </a:rPr>
+              <a:t>Python modules</a:t>
+            </a:r>
+          </a:p>
+        </p:txBody>
+      </p:sp>
+      <p:sp>
+        <p:nvSpPr>
+          <p:cNvPr id="117" name="TextBox 116">
+            <a:extLst>
+              <a:ext uri="{FF2B5EF4-FFF2-40B4-BE49-F238E27FC236}">
+                <a16:creationId xmlns:a16="http://schemas.microsoft.com/office/drawing/2014/main" id="{8B066607-7368-49C1-96F3-9CA56EABD96A}"/>
+              </a:ext>
+            </a:extLst>
+          </p:cNvPr>
+          <p:cNvSpPr txBox="1"/>
+          <p:nvPr/>
+        </p:nvSpPr>
+        <p:spPr>
+          <a:xfrm>
+            <a:off x="7390781" y="1968359"/>
+            <a:ext cx="1100817" cy="184666"/>
+          </a:xfrm>
+          <a:prstGeom prst="rect">
+            <a:avLst/>
+          </a:prstGeom>
+          <a:noFill/>
+        </p:spPr>
+        <p:txBody>
+          <a:bodyPr wrap="square" rtlCol="0">
+            <a:spAutoFit/>
+          </a:bodyPr>
+          <a:lstStyle/>
+          <a:p>
+            <a:r>
+              <a:rPr lang="en-GB" sz="600" dirty="0">
+                <a:solidFill>
+                  <a:schemeClr val="bg1"/>
+                </a:solidFill>
+              </a:rPr>
+              <a:t>Reference files</a:t>
+            </a:r>
+          </a:p>
+        </p:txBody>
+      </p:sp>
+      <p:sp>
+        <p:nvSpPr>
+          <p:cNvPr id="121" name="TextBox 120">
+            <a:extLst>
+              <a:ext uri="{FF2B5EF4-FFF2-40B4-BE49-F238E27FC236}">
+                <a16:creationId xmlns:a16="http://schemas.microsoft.com/office/drawing/2014/main" id="{6972F88F-7EB9-4F09-8D5C-146713AE1196}"/>
+              </a:ext>
+            </a:extLst>
+          </p:cNvPr>
+          <p:cNvSpPr txBox="1"/>
+          <p:nvPr/>
+        </p:nvSpPr>
+        <p:spPr>
+          <a:xfrm>
+            <a:off x="3850377" y="1826243"/>
+            <a:ext cx="999622" cy="369332"/>
+          </a:xfrm>
+          <a:prstGeom prst="rect">
+            <a:avLst/>
+          </a:prstGeom>
+          <a:noFill/>
+        </p:spPr>
+        <p:txBody>
+          <a:bodyPr wrap="square" rtlCol="0">
+            <a:spAutoFit/>
+          </a:bodyPr>
+          <a:lstStyle/>
+          <a:p>
+            <a:pPr algn="ctr"/>
+            <a:r>
+              <a:rPr lang="en-GB" sz="600" b="1" dirty="0">
+                <a:solidFill>
+                  <a:schemeClr val="bg1"/>
+                </a:solidFill>
+              </a:rPr>
+              <a:t>Package used for Application dependencies</a:t>
+            </a:r>
+          </a:p>
+        </p:txBody>
+      </p:sp>
+      <p:sp>
+        <p:nvSpPr>
+          <p:cNvPr id="122" name="TextBox 121">
+            <a:extLst>
+              <a:ext uri="{FF2B5EF4-FFF2-40B4-BE49-F238E27FC236}">
+                <a16:creationId xmlns:a16="http://schemas.microsoft.com/office/drawing/2014/main" id="{534012EE-FD95-4ED8-B878-EBC48525E3AD}"/>
+              </a:ext>
+            </a:extLst>
+          </p:cNvPr>
+          <p:cNvSpPr txBox="1"/>
+          <p:nvPr/>
+        </p:nvSpPr>
+        <p:spPr>
+          <a:xfrm>
+            <a:off x="11063587" y="3394080"/>
+            <a:ext cx="947379" cy="369332"/>
+          </a:xfrm>
+          <a:prstGeom prst="rect">
+            <a:avLst/>
+          </a:prstGeom>
+          <a:noFill/>
+        </p:spPr>
+        <p:txBody>
+          <a:bodyPr wrap="square" rtlCol="0">
+            <a:spAutoFit/>
+          </a:bodyPr>
+          <a:lstStyle/>
+          <a:p>
+            <a:r>
+              <a:rPr lang="en-GB" sz="600" dirty="0">
+                <a:solidFill>
+                  <a:srgbClr val="7030A0"/>
+                </a:solidFill>
+              </a:rPr>
+              <a:t>HTTP REST request/response using Trello API library</a:t>
             </a:r>
           </a:p>
         </p:txBody>
@@ -8256,7 +10233,7 @@
     </p:spTree>
     <p:extLst>
       <p:ext uri="{BB962C8B-B14F-4D97-AF65-F5344CB8AC3E}">
-        <p14:creationId xmlns:p14="http://schemas.microsoft.com/office/powerpoint/2010/main" val="1943718463"/>
+        <p14:creationId xmlns:p14="http://schemas.microsoft.com/office/powerpoint/2010/main" val="3948076295"/>
       </p:ext>
     </p:extLst>
   </p:cSld>

</xml_diff>